<commit_message>
Remove notes from presentation
</commit_message>
<xml_diff>
--- a/Realm.nor.pptx
+++ b/Realm.nor.pptx
@@ -213,7 +213,7 @@
           <a:p>
             <a:fld id="{25848CE7-F517-B54E-B4AF-F304204D7A04}" type="datetimeFigureOut">
               <a:rPr lang="en-US" smtClean="0"/>
-              <a:t>3/2/2017</a:t>
+              <a:t>3/8/17</a:t>
             </a:fld>
             <a:endParaRPr lang="en-US"/>
           </a:p>
@@ -541,187 +541,6 @@
               <a:tabLst/>
               <a:defRPr/>
             </a:pPr>
-            <a:r>
-              <a:rPr lang="en-US" baseline="0" dirty="0"/>
-              <a:t>Mitt </a:t>
-            </a:r>
-            <a:r>
-              <a:rPr lang="en-US" baseline="0" dirty="0" err="1"/>
-              <a:t>navn</a:t>
-            </a:r>
-            <a:r>
-              <a:rPr lang="en-US" baseline="0" dirty="0"/>
-              <a:t> </a:t>
-            </a:r>
-            <a:r>
-              <a:rPr lang="en-US" baseline="0" dirty="0" err="1"/>
-              <a:t>er</a:t>
-            </a:r>
-            <a:r>
-              <a:rPr lang="en-US" baseline="0" dirty="0"/>
-              <a:t> Jon</a:t>
-            </a:r>
-          </a:p>
-          <a:p>
-            <a:pPr marL="171450" marR="0" lvl="0" indent="-171450" algn="l" defTabSz="914400" rtl="0" eaLnBrk="1" fontAlgn="auto" latinLnBrk="0" hangingPunct="1">
-              <a:lnSpc>
-                <a:spcPct val="100000"/>
-              </a:lnSpc>
-              <a:spcBef>
-                <a:spcPts val="0"/>
-              </a:spcBef>
-              <a:spcAft>
-                <a:spcPts val="0"/>
-              </a:spcAft>
-              <a:buClrTx/>
-              <a:buSzTx/>
-              <a:buFont typeface="Arial" panose="020B0604020202020204" pitchFamily="34" charset="0"/>
-              <a:buChar char="•"/>
-              <a:tabLst/>
-              <a:defRPr/>
-            </a:pPr>
-            <a:r>
-              <a:rPr lang="en-US" baseline="0" dirty="0" err="1"/>
-              <a:t>Jeg</a:t>
-            </a:r>
-            <a:r>
-              <a:rPr lang="en-US" baseline="0" dirty="0"/>
-              <a:t> </a:t>
-            </a:r>
-            <a:r>
-              <a:rPr lang="en-US" baseline="0" dirty="0" err="1"/>
-              <a:t>skal</a:t>
-            </a:r>
-            <a:r>
-              <a:rPr lang="en-US" baseline="0" dirty="0"/>
-              <a:t> </a:t>
-            </a:r>
-            <a:r>
-              <a:rPr lang="en-US" baseline="0" dirty="0" err="1"/>
-              <a:t>snakke</a:t>
-            </a:r>
-            <a:r>
-              <a:rPr lang="en-US" baseline="0" dirty="0"/>
-              <a:t> om Realm</a:t>
-            </a:r>
-          </a:p>
-          <a:p>
-            <a:pPr marL="171450" marR="0" lvl="0" indent="-171450" algn="l" defTabSz="914400" rtl="0" eaLnBrk="1" fontAlgn="auto" latinLnBrk="0" hangingPunct="1">
-              <a:lnSpc>
-                <a:spcPct val="100000"/>
-              </a:lnSpc>
-              <a:spcBef>
-                <a:spcPts val="0"/>
-              </a:spcBef>
-              <a:spcAft>
-                <a:spcPts val="0"/>
-              </a:spcAft>
-              <a:buClrTx/>
-              <a:buSzTx/>
-              <a:buFont typeface="Arial" panose="020B0604020202020204" pitchFamily="34" charset="0"/>
-              <a:buChar char="•"/>
-              <a:tabLst/>
-              <a:defRPr/>
-            </a:pPr>
-            <a:r>
-              <a:rPr lang="en-US" baseline="0" dirty="0"/>
-              <a:t>Mobil database </a:t>
-            </a:r>
-            <a:r>
-              <a:rPr lang="en-US" baseline="0" dirty="0" err="1"/>
-              <a:t>som</a:t>
-            </a:r>
-            <a:r>
-              <a:rPr lang="en-US" baseline="0" dirty="0"/>
-              <a:t> </a:t>
-            </a:r>
-            <a:r>
-              <a:rPr lang="en-US" baseline="0" dirty="0" err="1"/>
-              <a:t>ikke</a:t>
-            </a:r>
-            <a:r>
-              <a:rPr lang="en-US" baseline="0" dirty="0"/>
-              <a:t> </a:t>
-            </a:r>
-            <a:r>
-              <a:rPr lang="en-US" baseline="0" dirty="0" err="1"/>
-              <a:t>er</a:t>
-            </a:r>
-            <a:r>
-              <a:rPr lang="en-US" baseline="0" dirty="0"/>
-              <a:t> SQLite</a:t>
-            </a:r>
-            <a:endParaRPr lang="en-US" dirty="0"/>
-          </a:p>
-          <a:p>
-            <a:pPr marL="171450" lvl="0" indent="-171450">
-              <a:buFont typeface="Arial" panose="020B0604020202020204" pitchFamily="34" charset="0"/>
-              <a:buChar char="•"/>
-            </a:pPr>
-            <a:r>
-              <a:rPr lang="en-US" dirty="0" err="1"/>
-              <a:t>Hvem</a:t>
-            </a:r>
-            <a:r>
-              <a:rPr lang="en-US" baseline="0" dirty="0"/>
-              <a:t> </a:t>
-            </a:r>
-            <a:r>
-              <a:rPr lang="en-US" baseline="0" dirty="0" err="1"/>
-              <a:t>har</a:t>
-            </a:r>
-            <a:r>
-              <a:rPr lang="en-US" baseline="0" dirty="0"/>
-              <a:t> </a:t>
-            </a:r>
-            <a:r>
-              <a:rPr lang="en-US" baseline="0" dirty="0" err="1"/>
-              <a:t>hørt</a:t>
-            </a:r>
-            <a:r>
-              <a:rPr lang="en-US" baseline="0" dirty="0"/>
-              <a:t> om Realm?</a:t>
-            </a:r>
-          </a:p>
-          <a:p>
-            <a:pPr marL="171450" lvl="0" indent="-171450">
-              <a:buFont typeface="Arial" panose="020B0604020202020204" pitchFamily="34" charset="0"/>
-              <a:buChar char="•"/>
-            </a:pPr>
-            <a:r>
-              <a:rPr lang="en-US" baseline="0" dirty="0" err="1"/>
-              <a:t>Brukt</a:t>
-            </a:r>
-            <a:r>
-              <a:rPr lang="en-US" baseline="0" dirty="0"/>
-              <a:t> Realm?</a:t>
-            </a:r>
-          </a:p>
-          <a:p>
-            <a:pPr marL="171450" lvl="0" indent="-171450">
-              <a:buFont typeface="Arial" panose="020B0604020202020204" pitchFamily="34" charset="0"/>
-              <a:buChar char="•"/>
-            </a:pPr>
-            <a:r>
-              <a:rPr lang="en-US" baseline="0" dirty="0" err="1"/>
-              <a:t>Spør</a:t>
-            </a:r>
-            <a:r>
-              <a:rPr lang="en-US" baseline="0" dirty="0"/>
-              <a:t> </a:t>
-            </a:r>
-            <a:r>
-              <a:rPr lang="en-US" baseline="0" dirty="0" err="1"/>
-              <a:t>spørsmål</a:t>
-            </a:r>
-            <a:r>
-              <a:rPr lang="en-US" baseline="0" dirty="0"/>
-              <a:t> </a:t>
-            </a:r>
-            <a:r>
-              <a:rPr lang="en-US" baseline="0" dirty="0" err="1"/>
-              <a:t>underveis</a:t>
-            </a:r>
             <a:endParaRPr lang="en-US" baseline="0" dirty="0"/>
           </a:p>
         </p:txBody>
@@ -810,67 +629,7 @@
               <a:buFont typeface="Arial" panose="020B0604020202020204" pitchFamily="34" charset="0"/>
               <a:buChar char="•"/>
             </a:pPr>
-            <a:r>
-              <a:rPr lang="nb-NO" noProof="0" dirty="0"/>
-              <a:t>Veldig høy ytelse</a:t>
-            </a:r>
-          </a:p>
-          <a:p>
-            <a:pPr marL="628650" lvl="1" indent="-171450">
-              <a:buFont typeface="Arial" panose="020B0604020202020204" pitchFamily="34" charset="0"/>
-              <a:buChar char="•"/>
-            </a:pPr>
-            <a:r>
-              <a:rPr lang="nb-NO" noProof="0" dirty="0"/>
-              <a:t>Sammenligning med SQLite og biblioteket bygget på SQLite</a:t>
-            </a:r>
-          </a:p>
-          <a:p>
-            <a:pPr marL="628650" lvl="1" indent="-171450">
-              <a:buFont typeface="Arial" panose="020B0604020202020204" pitchFamily="34" charset="0"/>
-              <a:buChar char="•"/>
-            </a:pPr>
-            <a:r>
-              <a:rPr lang="nb-NO" noProof="0" dirty="0"/>
-              <a:t>Denne</a:t>
-            </a:r>
-            <a:r>
-              <a:rPr lang="nb-NO" baseline="0" noProof="0" dirty="0"/>
-              <a:t> tar også høyde for gjenbruk av kompilerte SQLite-spørringer</a:t>
-            </a:r>
-          </a:p>
-          <a:p>
-            <a:pPr marL="171450" indent="-171450">
-              <a:buFont typeface="Arial" panose="020B0604020202020204" pitchFamily="34" charset="0"/>
-              <a:buChar char="•"/>
-            </a:pPr>
-            <a:r>
-              <a:rPr lang="nb-NO" noProof="0" dirty="0"/>
-              <a:t>Tell antall objekt</a:t>
-            </a:r>
-          </a:p>
-          <a:p>
-            <a:pPr marL="171450" marR="0" lvl="0" indent="-171450" algn="l" defTabSz="914400" rtl="0" eaLnBrk="1" fontAlgn="auto" latinLnBrk="0" hangingPunct="1">
-              <a:lnSpc>
-                <a:spcPct val="100000"/>
-              </a:lnSpc>
-              <a:spcBef>
-                <a:spcPts val="0"/>
-              </a:spcBef>
-              <a:spcAft>
-                <a:spcPts val="0"/>
-              </a:spcAft>
-              <a:buClrTx/>
-              <a:buSzTx/>
-              <a:buFont typeface="Arial" panose="020B0604020202020204" pitchFamily="34" charset="0"/>
-              <a:buChar char="•"/>
-              <a:tabLst/>
-              <a:defRPr/>
-            </a:pPr>
-            <a:r>
-              <a:rPr lang="nb-NO" baseline="0" noProof="0" dirty="0"/>
-              <a:t>Tall fra 2014 på iPad</a:t>
-            </a:r>
+            <a:endParaRPr lang="nb-NO" baseline="0" noProof="0" dirty="0"/>
           </a:p>
         </p:txBody>
       </p:sp>
@@ -958,26 +717,6 @@
               <a:buFont typeface="Arial" panose="020B0604020202020204" pitchFamily="34" charset="0"/>
               <a:buChar char="•"/>
             </a:pPr>
-            <a:r>
-              <a:rPr lang="en-US" dirty="0" err="1"/>
-              <a:t>Antall</a:t>
-            </a:r>
-            <a:r>
-              <a:rPr lang="en-US" dirty="0"/>
-              <a:t> </a:t>
-            </a:r>
-            <a:r>
-              <a:rPr lang="en-US" dirty="0" err="1"/>
-              <a:t>spørringer</a:t>
-            </a:r>
-            <a:r>
-              <a:rPr lang="en-US" dirty="0"/>
-              <a:t> per </a:t>
-            </a:r>
-            <a:r>
-              <a:rPr lang="en-US" dirty="0" err="1"/>
-              <a:t>sekund</a:t>
-            </a:r>
             <a:endParaRPr lang="en-US" dirty="0"/>
           </a:p>
         </p:txBody>
@@ -1066,34 +805,6 @@
               <a:buFont typeface="Arial" panose="020B0604020202020204" pitchFamily="34" charset="0"/>
               <a:buChar char="•"/>
             </a:pPr>
-            <a:r>
-              <a:rPr lang="en-US" dirty="0" err="1"/>
-              <a:t>Antall</a:t>
-            </a:r>
-            <a:r>
-              <a:rPr lang="en-US" dirty="0"/>
-              <a:t> </a:t>
-            </a:r>
-            <a:r>
-              <a:rPr lang="en-US" dirty="0" err="1"/>
-              <a:t>objekt</a:t>
-            </a:r>
-            <a:r>
-              <a:rPr lang="en-US" dirty="0"/>
-              <a:t> </a:t>
-            </a:r>
-            <a:r>
-              <a:rPr lang="en-US" dirty="0" err="1"/>
-              <a:t>satt</a:t>
-            </a:r>
-            <a:r>
-              <a:rPr lang="en-US" dirty="0"/>
-              <a:t> inn per </a:t>
-            </a:r>
-            <a:r>
-              <a:rPr lang="en-US" dirty="0" err="1"/>
-              <a:t>sekund</a:t>
-            </a:r>
             <a:endParaRPr lang="en-US" dirty="0"/>
           </a:p>
         </p:txBody>
@@ -1182,30 +893,6 @@
               <a:buFont typeface="Arial" panose="020B0604020202020204" pitchFamily="34" charset="0"/>
               <a:buChar char="•"/>
             </a:pPr>
-            <a:r>
-              <a:rPr lang="nb-NO" dirty="0"/>
-              <a:t>Modent produkt</a:t>
-            </a:r>
-          </a:p>
-          <a:p>
-            <a:pPr marL="171450" indent="-171450">
-              <a:buFont typeface="Arial" panose="020B0604020202020204" pitchFamily="34" charset="0"/>
-              <a:buChar char="•"/>
-            </a:pPr>
-            <a:r>
-              <a:rPr lang="nb-NO" dirty="0"/>
-              <a:t>Ble startet i 2012</a:t>
-            </a:r>
-          </a:p>
-          <a:p>
-            <a:pPr marL="171450" indent="-171450">
-              <a:buFont typeface="Arial" panose="020B0604020202020204" pitchFamily="34" charset="0"/>
-              <a:buChar char="•"/>
-            </a:pPr>
-            <a:r>
-              <a:rPr lang="nb-NO" dirty="0"/>
-              <a:t>Offentlig slipp i 2014</a:t>
-            </a:r>
             <a:endParaRPr lang="nn-NO" dirty="0"/>
           </a:p>
         </p:txBody>
@@ -1378,266 +1065,7 @@
               <a:buFont typeface="Arial" panose="020B0604020202020204" pitchFamily="34" charset="0"/>
               <a:buChar char="•"/>
             </a:pPr>
-            <a:r>
-              <a:rPr lang="en-US" baseline="0" dirty="0" err="1"/>
-              <a:t>Består</a:t>
-            </a:r>
-            <a:r>
-              <a:rPr lang="en-US" baseline="0" dirty="0"/>
-              <a:t> </a:t>
-            </a:r>
-            <a:r>
-              <a:rPr lang="en-US" baseline="0" dirty="0" err="1"/>
-              <a:t>av</a:t>
-            </a:r>
-            <a:r>
-              <a:rPr lang="en-US" baseline="0" dirty="0"/>
-              <a:t> to </a:t>
-            </a:r>
-            <a:r>
-              <a:rPr lang="en-US" baseline="0" dirty="0" err="1"/>
-              <a:t>deler</a:t>
-            </a:r>
             <a:endParaRPr lang="en-US" baseline="0" dirty="0"/>
-          </a:p>
-          <a:p>
-            <a:pPr marL="171450" indent="-171450">
-              <a:buFont typeface="Arial" panose="020B0604020202020204" pitchFamily="34" charset="0"/>
-              <a:buChar char="•"/>
-            </a:pPr>
-            <a:r>
-              <a:rPr lang="en-US" baseline="0" dirty="0"/>
-              <a:t>RMD</a:t>
-            </a:r>
-          </a:p>
-          <a:p>
-            <a:pPr marL="628650" lvl="1" indent="-171450">
-              <a:buFont typeface="Arial" panose="020B0604020202020204" pitchFamily="34" charset="0"/>
-              <a:buChar char="•"/>
-            </a:pPr>
-            <a:r>
-              <a:rPr lang="en-US" baseline="0" dirty="0" err="1"/>
-              <a:t>Snart</a:t>
-            </a:r>
-            <a:r>
-              <a:rPr lang="en-US" baseline="0" dirty="0"/>
-              <a:t> 3 </a:t>
-            </a:r>
-            <a:r>
-              <a:rPr lang="en-US" baseline="0" dirty="0" err="1"/>
-              <a:t>år</a:t>
-            </a:r>
-            <a:endParaRPr lang="en-US" baseline="0" dirty="0"/>
-          </a:p>
-          <a:p>
-            <a:pPr marL="628650" lvl="1" indent="-171450">
-              <a:buFont typeface="Arial" panose="020B0604020202020204" pitchFamily="34" charset="0"/>
-              <a:buChar char="•"/>
-            </a:pPr>
-            <a:r>
-              <a:rPr lang="en-US" baseline="0" dirty="0"/>
-              <a:t>Database for </a:t>
-            </a:r>
-            <a:r>
-              <a:rPr lang="en-US" baseline="0" dirty="0" err="1"/>
-              <a:t>lagring</a:t>
-            </a:r>
-            <a:r>
-              <a:rPr lang="en-US" baseline="0" dirty="0"/>
-              <a:t> </a:t>
-            </a:r>
-            <a:r>
-              <a:rPr lang="en-US" baseline="0" dirty="0" err="1"/>
-              <a:t>på</a:t>
-            </a:r>
-            <a:r>
-              <a:rPr lang="en-US" baseline="0" dirty="0"/>
-              <a:t> </a:t>
-            </a:r>
-            <a:r>
-              <a:rPr lang="en-US" baseline="0" dirty="0" err="1"/>
-              <a:t>klient</a:t>
-            </a:r>
-            <a:endParaRPr lang="en-US" baseline="0" dirty="0"/>
-          </a:p>
-          <a:p>
-            <a:pPr marL="171450" indent="-171450">
-              <a:buFont typeface="Arial" panose="020B0604020202020204" pitchFamily="34" charset="0"/>
-              <a:buChar char="•"/>
-            </a:pPr>
-            <a:r>
-              <a:rPr lang="en-US" baseline="0" dirty="0"/>
-              <a:t>RMP</a:t>
-            </a:r>
-          </a:p>
-          <a:p>
-            <a:pPr marL="628650" lvl="1" indent="-171450">
-              <a:buFont typeface="Arial" panose="020B0604020202020204" pitchFamily="34" charset="0"/>
-              <a:buChar char="•"/>
-            </a:pPr>
-            <a:r>
-              <a:rPr lang="en-US" baseline="0" dirty="0" err="1"/>
-              <a:t>Halvt</a:t>
-            </a:r>
-            <a:r>
-              <a:rPr lang="en-US" baseline="0" dirty="0"/>
-              <a:t> </a:t>
-            </a:r>
-            <a:r>
-              <a:rPr lang="en-US" baseline="0" dirty="0" err="1"/>
-              <a:t>år</a:t>
-            </a:r>
-            <a:endParaRPr lang="en-US" baseline="0" dirty="0"/>
-          </a:p>
-          <a:p>
-            <a:pPr marL="628650" lvl="1" indent="-171450">
-              <a:buFont typeface="Arial" panose="020B0604020202020204" pitchFamily="34" charset="0"/>
-              <a:buChar char="•"/>
-            </a:pPr>
-            <a:r>
-              <a:rPr lang="en-US" baseline="0" dirty="0" err="1"/>
-              <a:t>Kjøres</a:t>
-            </a:r>
-            <a:r>
-              <a:rPr lang="en-US" baseline="0" dirty="0"/>
-              <a:t> </a:t>
-            </a:r>
-            <a:r>
-              <a:rPr lang="en-US" baseline="0" dirty="0" err="1"/>
-              <a:t>på</a:t>
-            </a:r>
-            <a:r>
-              <a:rPr lang="en-US" baseline="0" dirty="0"/>
-              <a:t> </a:t>
-            </a:r>
-            <a:r>
-              <a:rPr lang="en-US" baseline="0" dirty="0" err="1"/>
-              <a:t>egen</a:t>
-            </a:r>
-            <a:r>
-              <a:rPr lang="en-US" baseline="0" dirty="0"/>
-              <a:t> server</a:t>
-            </a:r>
-          </a:p>
-          <a:p>
-            <a:pPr marL="628650" lvl="1" indent="-171450">
-              <a:buFont typeface="Arial" panose="020B0604020202020204" pitchFamily="34" charset="0"/>
-              <a:buChar char="•"/>
-            </a:pPr>
-            <a:r>
-              <a:rPr lang="en-US" baseline="0" dirty="0" err="1"/>
-              <a:t>Endringer</a:t>
-            </a:r>
-            <a:r>
-              <a:rPr lang="en-US" baseline="0" dirty="0"/>
-              <a:t> </a:t>
-            </a:r>
-            <a:r>
-              <a:rPr lang="en-US" baseline="0" dirty="0" err="1"/>
-              <a:t>på</a:t>
-            </a:r>
-            <a:r>
-              <a:rPr lang="en-US" baseline="0" dirty="0"/>
-              <a:t> </a:t>
-            </a:r>
-            <a:r>
-              <a:rPr lang="en-US" baseline="0" dirty="0" err="1"/>
-              <a:t>klient</a:t>
-            </a:r>
-            <a:r>
-              <a:rPr lang="en-US" baseline="0" dirty="0"/>
-              <a:t> </a:t>
-            </a:r>
-            <a:r>
-              <a:rPr lang="en-US" baseline="0" dirty="0" err="1"/>
-              <a:t>blir</a:t>
-            </a:r>
-            <a:r>
-              <a:rPr lang="en-US" baseline="0" dirty="0"/>
-              <a:t> </a:t>
-            </a:r>
-            <a:r>
-              <a:rPr lang="en-US" baseline="0" dirty="0" err="1"/>
-              <a:t>pushet</a:t>
-            </a:r>
-            <a:r>
-              <a:rPr lang="en-US" baseline="0" dirty="0"/>
-              <a:t> til server</a:t>
-            </a:r>
-          </a:p>
-          <a:p>
-            <a:pPr marL="1085850" lvl="2" indent="-171450">
-              <a:buFont typeface="Arial" panose="020B0604020202020204" pitchFamily="34" charset="0"/>
-              <a:buChar char="•"/>
-            </a:pPr>
-            <a:r>
-              <a:rPr lang="en-US" baseline="0" dirty="0" err="1"/>
-              <a:t>Deretter</a:t>
-            </a:r>
-            <a:r>
-              <a:rPr lang="en-US" baseline="0" dirty="0"/>
-              <a:t> </a:t>
-            </a:r>
-            <a:r>
-              <a:rPr lang="en-US" baseline="0" dirty="0" err="1"/>
-              <a:t>fra</a:t>
-            </a:r>
-            <a:r>
-              <a:rPr lang="en-US" baseline="0" dirty="0"/>
-              <a:t> server til </a:t>
-            </a:r>
-            <a:r>
-              <a:rPr lang="en-US" baseline="0" dirty="0" err="1"/>
-              <a:t>klienter</a:t>
-            </a:r>
-            <a:endParaRPr lang="en-US" baseline="0" dirty="0"/>
-          </a:p>
-          <a:p>
-            <a:pPr marL="628650" marR="0" lvl="1" indent="-171450" algn="l" defTabSz="914400" rtl="0" eaLnBrk="1" fontAlgn="auto" latinLnBrk="0" hangingPunct="1">
-              <a:lnSpc>
-                <a:spcPct val="100000"/>
-              </a:lnSpc>
-              <a:spcBef>
-                <a:spcPts val="0"/>
-              </a:spcBef>
-              <a:spcAft>
-                <a:spcPts val="0"/>
-              </a:spcAft>
-              <a:buClrTx/>
-              <a:buSzTx/>
-              <a:buFont typeface="Arial" panose="020B0604020202020204" pitchFamily="34" charset="0"/>
-              <a:buChar char="•"/>
-              <a:tabLst/>
-              <a:defRPr/>
-            </a:pPr>
-            <a:r>
-              <a:rPr lang="en-US" baseline="0" dirty="0"/>
-              <a:t>Server med </a:t>
-            </a:r>
-            <a:r>
-              <a:rPr lang="en-US" baseline="0" dirty="0" err="1"/>
-              <a:t>automatisk</a:t>
-            </a:r>
-            <a:r>
-              <a:rPr lang="en-US" baseline="0" dirty="0"/>
-              <a:t> </a:t>
-            </a:r>
-            <a:r>
-              <a:rPr lang="en-US" baseline="0" dirty="0" err="1"/>
-              <a:t>synk</a:t>
-            </a:r>
-            <a:r>
-              <a:rPr lang="en-US" baseline="0" dirty="0"/>
-              <a:t> (</a:t>
-            </a:r>
-            <a:r>
-              <a:rPr lang="en-US" baseline="0" dirty="0" err="1"/>
-              <a:t>tenk</a:t>
-            </a:r>
-            <a:r>
-              <a:rPr lang="en-US" baseline="0" dirty="0"/>
-              <a:t> Firebase)</a:t>
-            </a:r>
           </a:p>
         </p:txBody>
       </p:sp>
@@ -1725,322 +1153,6 @@
               <a:buFont typeface="Arial" panose="020B0604020202020204" pitchFamily="34" charset="0"/>
               <a:buChar char="•"/>
             </a:pPr>
-            <a:r>
-              <a:rPr lang="en-US" baseline="0" dirty="0"/>
-              <a:t>RMD</a:t>
-            </a:r>
-          </a:p>
-          <a:p>
-            <a:pPr marL="685800" lvl="1" indent="-228600">
-              <a:buFont typeface="Arial" panose="020B0604020202020204" pitchFamily="34" charset="0"/>
-              <a:buChar char="•"/>
-            </a:pPr>
-            <a:r>
-              <a:rPr lang="en-US" baseline="0" dirty="0"/>
-              <a:t>Open source</a:t>
-            </a:r>
-          </a:p>
-          <a:p>
-            <a:pPr marL="685800" lvl="1" indent="-228600">
-              <a:buFont typeface="Arial" panose="020B0604020202020204" pitchFamily="34" charset="0"/>
-              <a:buChar char="•"/>
-            </a:pPr>
-            <a:r>
-              <a:rPr lang="en-US" baseline="0" dirty="0"/>
-              <a:t>Gratis å </a:t>
-            </a:r>
-            <a:r>
-              <a:rPr lang="en-US" baseline="0" dirty="0" err="1"/>
-              <a:t>bruke</a:t>
-            </a:r>
-            <a:endParaRPr lang="en-US" baseline="0" dirty="0"/>
-          </a:p>
-          <a:p>
-            <a:pPr marL="685800" lvl="1" indent="-228600">
-              <a:buFont typeface="Arial" panose="020B0604020202020204" pitchFamily="34" charset="0"/>
-              <a:buChar char="•"/>
-            </a:pPr>
-            <a:r>
-              <a:rPr lang="en-US" baseline="0" dirty="0"/>
-              <a:t>Ligger </a:t>
-            </a:r>
-            <a:r>
-              <a:rPr lang="en-US" baseline="0" dirty="0" err="1"/>
-              <a:t>på</a:t>
-            </a:r>
-            <a:r>
-              <a:rPr lang="en-US" baseline="0" dirty="0"/>
-              <a:t> </a:t>
-            </a:r>
-            <a:r>
-              <a:rPr lang="en-US" baseline="0" dirty="0" err="1"/>
-              <a:t>Github</a:t>
-            </a:r>
-            <a:endParaRPr lang="en-US" baseline="0" dirty="0"/>
-          </a:p>
-          <a:p>
-            <a:pPr marL="685800" lvl="1" indent="-228600">
-              <a:buFont typeface="Arial" panose="020B0604020202020204" pitchFamily="34" charset="0"/>
-              <a:buChar char="•"/>
-            </a:pPr>
-            <a:r>
-              <a:rPr lang="en-US" baseline="0" dirty="0"/>
-              <a:t>Wrapper-</a:t>
-            </a:r>
-            <a:r>
-              <a:rPr lang="en-US" baseline="0" dirty="0" err="1"/>
-              <a:t>bibliotek</a:t>
-            </a:r>
-            <a:r>
-              <a:rPr lang="en-US" baseline="0" dirty="0"/>
-              <a:t> </a:t>
-            </a:r>
-            <a:r>
-              <a:rPr lang="en-US" baseline="0" dirty="0" err="1"/>
-              <a:t>også</a:t>
-            </a:r>
-            <a:r>
-              <a:rPr lang="en-US" baseline="0" dirty="0"/>
-              <a:t> </a:t>
-            </a:r>
-            <a:r>
-              <a:rPr lang="en-US" baseline="0" dirty="0" err="1"/>
-              <a:t>åpne</a:t>
-            </a:r>
-            <a:endParaRPr lang="en-US" baseline="0" dirty="0"/>
-          </a:p>
-          <a:p>
-            <a:pPr marL="228600" lvl="0" indent="-228600">
-              <a:buFont typeface="Arial" panose="020B0604020202020204" pitchFamily="34" charset="0"/>
-              <a:buChar char="•"/>
-            </a:pPr>
-            <a:r>
-              <a:rPr lang="en-US" baseline="0" dirty="0"/>
-              <a:t>RMP</a:t>
-            </a:r>
-          </a:p>
-          <a:p>
-            <a:pPr marL="685800" lvl="1" indent="-228600">
-              <a:buFont typeface="Arial" panose="020B0604020202020204" pitchFamily="34" charset="0"/>
-              <a:buChar char="•"/>
-            </a:pPr>
-            <a:r>
-              <a:rPr lang="en-US" baseline="0" dirty="0"/>
-              <a:t>Gratis å </a:t>
-            </a:r>
-            <a:r>
-              <a:rPr lang="en-US" baseline="0" dirty="0" err="1"/>
-              <a:t>bruke</a:t>
-            </a:r>
-            <a:endParaRPr lang="en-US" baseline="0" dirty="0"/>
-          </a:p>
-          <a:p>
-            <a:pPr marL="1143000" lvl="2" indent="-228600">
-              <a:buFont typeface="Arial" panose="020B0604020202020204" pitchFamily="34" charset="0"/>
-              <a:buChar char="•"/>
-            </a:pPr>
-            <a:r>
-              <a:rPr lang="en-US" baseline="0" dirty="0" err="1"/>
-              <a:t>Kjøres</a:t>
-            </a:r>
-            <a:r>
-              <a:rPr lang="en-US" baseline="0" dirty="0"/>
-              <a:t> </a:t>
-            </a:r>
-            <a:r>
-              <a:rPr lang="en-US" baseline="0" dirty="0" err="1"/>
-              <a:t>på</a:t>
-            </a:r>
-            <a:r>
-              <a:rPr lang="en-US" baseline="0" dirty="0"/>
-              <a:t> </a:t>
-            </a:r>
-            <a:r>
-              <a:rPr lang="en-US" baseline="0" dirty="0" err="1"/>
-              <a:t>egen</a:t>
-            </a:r>
-            <a:r>
-              <a:rPr lang="en-US" baseline="0" dirty="0"/>
-              <a:t> server</a:t>
-            </a:r>
-          </a:p>
-          <a:p>
-            <a:pPr marL="1143000" lvl="2" indent="-228600">
-              <a:buFont typeface="Arial" panose="020B0604020202020204" pitchFamily="34" charset="0"/>
-              <a:buChar char="•"/>
-            </a:pPr>
-            <a:r>
-              <a:rPr lang="en-US" baseline="0" dirty="0" err="1"/>
-              <a:t>Anbefaler</a:t>
-            </a:r>
-            <a:r>
-              <a:rPr lang="en-US" baseline="0" dirty="0"/>
-              <a:t> Digital Ocean ($5 / </a:t>
-            </a:r>
-            <a:r>
-              <a:rPr lang="en-US" baseline="0" dirty="0" err="1"/>
-              <a:t>måned</a:t>
-            </a:r>
-            <a:r>
-              <a:rPr lang="en-US" baseline="0" dirty="0"/>
-              <a:t>)</a:t>
-            </a:r>
-          </a:p>
-          <a:p>
-            <a:pPr marL="685800" lvl="1" indent="-228600">
-              <a:buFont typeface="Arial" panose="020B0604020202020204" pitchFamily="34" charset="0"/>
-              <a:buChar char="•"/>
-            </a:pPr>
-            <a:r>
-              <a:rPr lang="en-US" baseline="0" dirty="0"/>
-              <a:t>Pro for $1500 </a:t>
-            </a:r>
-            <a:r>
-              <a:rPr lang="en-US" baseline="0" dirty="0" err="1"/>
-              <a:t>pr</a:t>
-            </a:r>
-            <a:r>
-              <a:rPr lang="en-US" baseline="0" dirty="0"/>
-              <a:t> </a:t>
-            </a:r>
-            <a:r>
-              <a:rPr lang="en-US" baseline="0" dirty="0" err="1"/>
-              <a:t>måned</a:t>
-            </a:r>
-            <a:endParaRPr lang="en-US" baseline="0" dirty="0"/>
-          </a:p>
-          <a:p>
-            <a:pPr marL="1143000" lvl="2" indent="-228600">
-              <a:buFont typeface="Arial" panose="020B0604020202020204" pitchFamily="34" charset="0"/>
-              <a:buChar char="•"/>
-            </a:pPr>
-            <a:r>
-              <a:rPr lang="en-US" baseline="0" dirty="0" err="1"/>
-              <a:t>Tilgang</a:t>
-            </a:r>
-            <a:r>
-              <a:rPr lang="en-US" baseline="0" dirty="0"/>
-              <a:t> til Realm-database </a:t>
-            </a:r>
-            <a:r>
-              <a:rPr lang="en-US" baseline="0" dirty="0" err="1"/>
-              <a:t>fra</a:t>
-            </a:r>
-            <a:r>
-              <a:rPr lang="en-US" baseline="0" dirty="0"/>
-              <a:t> server via API</a:t>
-            </a:r>
-          </a:p>
-          <a:p>
-            <a:pPr marL="1600200" lvl="3" indent="-228600">
-              <a:buFont typeface="Arial" panose="020B0604020202020204" pitchFamily="34" charset="0"/>
-              <a:buChar char="•"/>
-            </a:pPr>
-            <a:r>
-              <a:rPr lang="en-US" baseline="0" dirty="0" err="1"/>
-              <a:t>Ellers</a:t>
-            </a:r>
-            <a:r>
-              <a:rPr lang="en-US" baseline="0" dirty="0"/>
-              <a:t> </a:t>
-            </a:r>
-            <a:r>
-              <a:rPr lang="en-US" baseline="0" dirty="0" err="1"/>
-              <a:t>kun</a:t>
-            </a:r>
-            <a:r>
-              <a:rPr lang="en-US" baseline="0" dirty="0"/>
-              <a:t> </a:t>
-            </a:r>
-            <a:r>
-              <a:rPr lang="en-US" baseline="0" dirty="0" err="1"/>
-              <a:t>klienter</a:t>
-            </a:r>
-            <a:r>
-              <a:rPr lang="en-US" baseline="0" dirty="0"/>
-              <a:t> via </a:t>
-            </a:r>
-            <a:r>
-              <a:rPr lang="en-US" baseline="0" dirty="0" err="1"/>
-              <a:t>synk</a:t>
-            </a:r>
-            <a:endParaRPr lang="en-US" baseline="0" dirty="0"/>
-          </a:p>
-          <a:p>
-            <a:pPr marL="1600200" lvl="3" indent="-228600">
-              <a:buFont typeface="Arial" panose="020B0604020202020204" pitchFamily="34" charset="0"/>
-              <a:buChar char="•"/>
-            </a:pPr>
-            <a:r>
-              <a:rPr lang="en-US" baseline="0" dirty="0"/>
-              <a:t>Andre </a:t>
-            </a:r>
-            <a:r>
-              <a:rPr lang="en-US" baseline="0" dirty="0" err="1"/>
-              <a:t>tjenester</a:t>
-            </a:r>
-            <a:r>
-              <a:rPr lang="en-US" baseline="0" dirty="0"/>
-              <a:t> </a:t>
-            </a:r>
-            <a:r>
-              <a:rPr lang="en-US" baseline="0" dirty="0" err="1"/>
-              <a:t>kan</a:t>
-            </a:r>
-            <a:r>
-              <a:rPr lang="en-US" baseline="0" dirty="0"/>
-              <a:t> lese </a:t>
-            </a:r>
-            <a:r>
-              <a:rPr lang="en-US" baseline="0" dirty="0" err="1"/>
-              <a:t>og</a:t>
-            </a:r>
-            <a:r>
-              <a:rPr lang="en-US" baseline="0" dirty="0"/>
-              <a:t> </a:t>
-            </a:r>
-            <a:r>
-              <a:rPr lang="en-US" baseline="0" dirty="0" err="1"/>
-              <a:t>skrive</a:t>
-            </a:r>
-            <a:r>
-              <a:rPr lang="en-US" baseline="0" dirty="0"/>
-              <a:t> data</a:t>
-            </a:r>
-          </a:p>
-          <a:p>
-            <a:pPr marL="1143000" lvl="2" indent="-228600">
-              <a:buFont typeface="Arial" panose="020B0604020202020204" pitchFamily="34" charset="0"/>
-              <a:buChar char="•"/>
-            </a:pPr>
-            <a:r>
-              <a:rPr lang="en-US" baseline="0" dirty="0" err="1"/>
-              <a:t>Håper</a:t>
-            </a:r>
-            <a:r>
-              <a:rPr lang="en-US" baseline="0" dirty="0"/>
-              <a:t> </a:t>
-            </a:r>
-            <a:r>
-              <a:rPr lang="en-US" baseline="0" dirty="0" err="1"/>
-              <a:t>på</a:t>
-            </a:r>
-            <a:r>
-              <a:rPr lang="en-US" baseline="0" dirty="0"/>
-              <a:t> </a:t>
-            </a:r>
-            <a:r>
-              <a:rPr lang="en-US" baseline="0" dirty="0" err="1"/>
-              <a:t>billigere</a:t>
-            </a:r>
-            <a:r>
-              <a:rPr lang="en-US" baseline="0" dirty="0"/>
-              <a:t> I </a:t>
-            </a:r>
-            <a:r>
-              <a:rPr lang="en-US" baseline="0" dirty="0" err="1"/>
-              <a:t>fremtiden</a:t>
-            </a:r>
             <a:endParaRPr lang="en-US" baseline="0" dirty="0"/>
           </a:p>
         </p:txBody>
@@ -2129,73 +1241,6 @@
               <a:buFont typeface="Arial" panose="020B0604020202020204" pitchFamily="34" charset="0"/>
               <a:buChar char="•"/>
             </a:pPr>
-            <a:r>
-              <a:rPr lang="en-US" baseline="0" dirty="0"/>
-              <a:t>For mobile platformer</a:t>
-            </a:r>
-          </a:p>
-          <a:p>
-            <a:pPr marL="171450" indent="-171450">
-              <a:buFont typeface="Arial" panose="020B0604020202020204" pitchFamily="34" charset="0"/>
-              <a:buChar char="•"/>
-            </a:pPr>
-            <a:r>
-              <a:rPr lang="en-US" baseline="0" dirty="0"/>
-              <a:t>iOS, </a:t>
-            </a:r>
-            <a:r>
-              <a:rPr lang="en-US" baseline="0" dirty="0" err="1"/>
-              <a:t>MacOS</a:t>
-            </a:r>
-            <a:r>
-              <a:rPr lang="en-US" baseline="0" dirty="0"/>
-              <a:t>, Android, </a:t>
-            </a:r>
-            <a:r>
-              <a:rPr lang="en-US" baseline="0" dirty="0" err="1"/>
-              <a:t>Xamarin</a:t>
-            </a:r>
-            <a:r>
-              <a:rPr lang="en-US" baseline="0" dirty="0"/>
-              <a:t>, React Native, Win32</a:t>
-            </a:r>
-          </a:p>
-          <a:p>
-            <a:pPr marL="171450" indent="-171450">
-              <a:buFont typeface="Arial" panose="020B0604020202020204" pitchFamily="34" charset="0"/>
-              <a:buChar char="•"/>
-            </a:pPr>
-            <a:r>
-              <a:rPr lang="en-US" baseline="0" dirty="0"/>
-              <a:t>UWP </a:t>
-            </a:r>
-            <a:r>
-              <a:rPr lang="en-US" baseline="0" dirty="0" err="1"/>
-              <a:t>er</a:t>
-            </a:r>
-            <a:r>
-              <a:rPr lang="en-US" baseline="0" dirty="0"/>
-              <a:t> </a:t>
-            </a:r>
-            <a:r>
-              <a:rPr lang="en-US" baseline="0" dirty="0" err="1"/>
-              <a:t>planlagt</a:t>
-            </a:r>
-            <a:endParaRPr lang="en-US" baseline="0" dirty="0"/>
-          </a:p>
-          <a:p>
-            <a:pPr marL="628650" lvl="1" indent="-171450">
-              <a:buFont typeface="Arial" panose="020B0604020202020204" pitchFamily="34" charset="0"/>
-              <a:buChar char="•"/>
-            </a:pPr>
-            <a:r>
-              <a:rPr lang="en-US" baseline="0" dirty="0"/>
-              <a:t>Ingen </a:t>
-            </a:r>
-            <a:r>
-              <a:rPr lang="en-US" baseline="0" dirty="0" err="1"/>
-              <a:t>tidsramme</a:t>
-            </a:r>
             <a:endParaRPr lang="en-US" baseline="0" dirty="0"/>
           </a:p>
         </p:txBody>
@@ -2284,107 +1329,6 @@
               <a:buFont typeface="Arial" panose="020B0604020202020204" pitchFamily="34" charset="0"/>
               <a:buChar char="•"/>
             </a:pPr>
-            <a:r>
-              <a:rPr lang="en-US" dirty="0"/>
-              <a:t>30 </a:t>
-            </a:r>
-            <a:r>
-              <a:rPr lang="en-US" dirty="0" err="1"/>
-              <a:t>nye</a:t>
-            </a:r>
-            <a:r>
-              <a:rPr lang="en-US" dirty="0"/>
-              <a:t> </a:t>
-            </a:r>
-            <a:r>
-              <a:rPr lang="en-US" dirty="0" err="1"/>
-              <a:t>serverdatabaser</a:t>
-            </a:r>
-            <a:r>
-              <a:rPr lang="en-US" dirty="0"/>
-              <a:t> </a:t>
-            </a:r>
-            <a:r>
-              <a:rPr lang="en-US" dirty="0" err="1"/>
-              <a:t>siden</a:t>
-            </a:r>
-            <a:r>
-              <a:rPr lang="en-US" dirty="0"/>
-              <a:t> 2000</a:t>
-            </a:r>
-            <a:endParaRPr lang="en-US" baseline="0" dirty="0"/>
-          </a:p>
-          <a:p>
-            <a:pPr marL="171450" indent="-171450">
-              <a:buFont typeface="Arial" panose="020B0604020202020204" pitchFamily="34" charset="0"/>
-              <a:buChar char="•"/>
-            </a:pPr>
-            <a:r>
-              <a:rPr lang="en-US" baseline="0" dirty="0" err="1"/>
-              <a:t>Mobildatabase</a:t>
-            </a:r>
-            <a:r>
-              <a:rPr lang="en-US" baseline="0" dirty="0"/>
-              <a:t> </a:t>
-            </a:r>
-            <a:r>
-              <a:rPr lang="en-US" baseline="0" dirty="0" err="1"/>
-              <a:t>er</a:t>
-            </a:r>
-            <a:r>
-              <a:rPr lang="en-US" baseline="0" dirty="0"/>
-              <a:t> bare SQLite (2000) </a:t>
-            </a:r>
-            <a:r>
-              <a:rPr lang="en-US" baseline="0" dirty="0" err="1"/>
-              <a:t>og</a:t>
-            </a:r>
-            <a:r>
-              <a:rPr lang="en-US" baseline="0" dirty="0"/>
-              <a:t> Realm</a:t>
-            </a:r>
-          </a:p>
-          <a:p>
-            <a:pPr marL="171450" indent="-171450">
-              <a:buFont typeface="Arial" panose="020B0604020202020204" pitchFamily="34" charset="0"/>
-              <a:buChar char="•"/>
-            </a:pPr>
-            <a:r>
-              <a:rPr lang="en-US" baseline="0" dirty="0" err="1"/>
-              <a:t>Optimalisere</a:t>
-            </a:r>
-            <a:r>
-              <a:rPr lang="en-US" baseline="0" dirty="0"/>
-              <a:t> for </a:t>
-            </a:r>
-            <a:r>
-              <a:rPr lang="en-US" baseline="0" dirty="0" err="1"/>
-              <a:t>moderne</a:t>
-            </a:r>
-            <a:r>
-              <a:rPr lang="en-US" baseline="0" dirty="0"/>
-              <a:t> </a:t>
-            </a:r>
-            <a:r>
-              <a:rPr lang="en-US" baseline="0" dirty="0" err="1"/>
-              <a:t>behov</a:t>
-            </a:r>
-            <a:r>
-              <a:rPr lang="en-US" baseline="0" dirty="0"/>
-              <a:t> / </a:t>
-            </a:r>
-            <a:r>
-              <a:rPr lang="en-US" baseline="0" dirty="0" err="1"/>
-              <a:t>mobil</a:t>
-            </a:r>
-            <a:r>
-              <a:rPr lang="en-US" baseline="0" dirty="0"/>
-              <a:t> </a:t>
-            </a:r>
-            <a:r>
-              <a:rPr lang="en-US" baseline="0" dirty="0" err="1"/>
-              <a:t>plattform</a:t>
-            </a:r>
             <a:endParaRPr lang="en-US" dirty="0"/>
           </a:p>
         </p:txBody>
@@ -2473,107 +1417,7 @@
               <a:buFont typeface="Arial" panose="020B0604020202020204" pitchFamily="34" charset="0"/>
               <a:buChar char="•"/>
             </a:pPr>
-            <a:r>
-              <a:rPr lang="en-US" baseline="0" dirty="0"/>
-              <a:t>SQLite </a:t>
-            </a:r>
-            <a:r>
-              <a:rPr lang="en-US" baseline="0" dirty="0" err="1"/>
-              <a:t>er</a:t>
-            </a:r>
-            <a:r>
-              <a:rPr lang="en-US" baseline="0" dirty="0"/>
-              <a:t> </a:t>
-            </a:r>
-            <a:r>
-              <a:rPr lang="en-US" baseline="0" dirty="0" err="1"/>
-              <a:t>brukt</a:t>
-            </a:r>
-            <a:r>
-              <a:rPr lang="en-US" baseline="0" dirty="0"/>
-              <a:t> </a:t>
-            </a:r>
-            <a:r>
-              <a:rPr lang="en-US" baseline="0" dirty="0" err="1"/>
-              <a:t>av</a:t>
-            </a:r>
-            <a:r>
-              <a:rPr lang="en-US" baseline="0" dirty="0"/>
-              <a:t> mange </a:t>
-            </a:r>
-            <a:r>
-              <a:rPr lang="en-US" baseline="0" dirty="0" err="1"/>
-              <a:t>løsninger</a:t>
-            </a:r>
-            <a:r>
-              <a:rPr lang="en-US" baseline="0" dirty="0"/>
-              <a:t>:</a:t>
-            </a:r>
-          </a:p>
-          <a:p>
-            <a:pPr marL="628650" lvl="1" indent="-171450">
-              <a:buFont typeface="Arial" panose="020B0604020202020204" pitchFamily="34" charset="0"/>
-              <a:buChar char="•"/>
-            </a:pPr>
-            <a:r>
-              <a:rPr lang="en-US" baseline="0" dirty="0" err="1"/>
-              <a:t>CouchDB</a:t>
-            </a:r>
             <a:endParaRPr lang="en-US" baseline="0" dirty="0"/>
-          </a:p>
-          <a:p>
-            <a:pPr marL="628650" lvl="1" indent="-171450">
-              <a:buFont typeface="Arial" panose="020B0604020202020204" pitchFamily="34" charset="0"/>
-              <a:buChar char="•"/>
-            </a:pPr>
-            <a:r>
-              <a:rPr lang="en-US" baseline="0" dirty="0"/>
-              <a:t>Core Data</a:t>
-            </a:r>
-          </a:p>
-          <a:p>
-            <a:pPr marL="628650" lvl="1" indent="-171450">
-              <a:buFont typeface="Arial" panose="020B0604020202020204" pitchFamily="34" charset="0"/>
-              <a:buChar char="•"/>
-            </a:pPr>
-            <a:r>
-              <a:rPr lang="en-US" baseline="0" dirty="0"/>
-              <a:t>Entity Framework</a:t>
-            </a:r>
-          </a:p>
-          <a:p>
-            <a:pPr marL="171450" indent="-171450">
-              <a:buFont typeface="Arial" panose="020B0604020202020204" pitchFamily="34" charset="0"/>
-              <a:buChar char="•"/>
-            </a:pPr>
-            <a:r>
-              <a:rPr lang="en-US" baseline="0" dirty="0"/>
-              <a:t>Realm </a:t>
-            </a:r>
-            <a:r>
-              <a:rPr lang="en-US" baseline="0" dirty="0" err="1"/>
-              <a:t>har</a:t>
-            </a:r>
-            <a:r>
-              <a:rPr lang="en-US" baseline="0" dirty="0"/>
-              <a:t> </a:t>
-            </a:r>
-            <a:r>
-              <a:rPr lang="en-US" baseline="0" dirty="0" err="1"/>
-              <a:t>egen</a:t>
-            </a:r>
-            <a:r>
-              <a:rPr lang="en-US" baseline="0" dirty="0"/>
-              <a:t> </a:t>
-            </a:r>
-            <a:r>
-              <a:rPr lang="en-US" baseline="0" dirty="0" err="1"/>
-              <a:t>databasemotor</a:t>
-            </a:r>
-            <a:r>
-              <a:rPr lang="en-US" baseline="0" dirty="0"/>
-              <a:t> I C++</a:t>
-            </a:r>
           </a:p>
         </p:txBody>
       </p:sp>
@@ -2661,371 +1505,7 @@
               <a:buFont typeface="Arial" panose="020B0604020202020204" pitchFamily="34" charset="0"/>
               <a:buChar char="•"/>
             </a:pPr>
-            <a:r>
-              <a:rPr lang="en-US" baseline="0" dirty="0"/>
-              <a:t>Realm </a:t>
-            </a:r>
-            <a:r>
-              <a:rPr lang="en-US" baseline="0" dirty="0" err="1"/>
-              <a:t>er</a:t>
-            </a:r>
-            <a:r>
-              <a:rPr lang="en-US" baseline="0" dirty="0"/>
-              <a:t> </a:t>
-            </a:r>
-            <a:r>
-              <a:rPr lang="en-US" baseline="0" dirty="0" err="1"/>
-              <a:t>en</a:t>
-            </a:r>
-            <a:r>
-              <a:rPr lang="en-US" baseline="0" dirty="0"/>
-              <a:t> </a:t>
-            </a:r>
-            <a:r>
-              <a:rPr lang="en-US" baseline="0" dirty="0" err="1"/>
-              <a:t>relasjonsdatabase</a:t>
-            </a:r>
             <a:endParaRPr lang="en-US" baseline="0" dirty="0"/>
-          </a:p>
-          <a:p>
-            <a:pPr marL="628650" lvl="1" indent="-171450">
-              <a:buFont typeface="Arial" panose="020B0604020202020204" pitchFamily="34" charset="0"/>
-              <a:buChar char="•"/>
-            </a:pPr>
-            <a:r>
-              <a:rPr lang="en-US" baseline="0" dirty="0"/>
-              <a:t>“</a:t>
-            </a:r>
-            <a:r>
-              <a:rPr lang="en-US" baseline="0" dirty="0" err="1"/>
-              <a:t>Tabeller</a:t>
-            </a:r>
-            <a:r>
-              <a:rPr lang="en-US" baseline="0" dirty="0"/>
-              <a:t>” med </a:t>
-            </a:r>
-            <a:r>
-              <a:rPr lang="en-US" baseline="0" dirty="0" err="1"/>
-              <a:t>rader</a:t>
-            </a:r>
-            <a:r>
-              <a:rPr lang="en-US" baseline="0" dirty="0"/>
-              <a:t> </a:t>
-            </a:r>
-            <a:r>
-              <a:rPr lang="en-US" baseline="0" dirty="0" err="1"/>
-              <a:t>og</a:t>
-            </a:r>
-            <a:r>
-              <a:rPr lang="en-US" baseline="0" dirty="0"/>
-              <a:t> </a:t>
-            </a:r>
-            <a:r>
-              <a:rPr lang="en-US" baseline="0" dirty="0" err="1"/>
-              <a:t>kolonner</a:t>
-            </a:r>
-            <a:endParaRPr lang="en-US" baseline="0" dirty="0"/>
-          </a:p>
-          <a:p>
-            <a:pPr marL="628650" marR="0" lvl="1" indent="-171450" algn="l" defTabSz="914400" rtl="0" eaLnBrk="1" fontAlgn="auto" latinLnBrk="0" hangingPunct="1">
-              <a:lnSpc>
-                <a:spcPct val="100000"/>
-              </a:lnSpc>
-              <a:spcBef>
-                <a:spcPts val="0"/>
-              </a:spcBef>
-              <a:spcAft>
-                <a:spcPts val="0"/>
-              </a:spcAft>
-              <a:buClrTx/>
-              <a:buSzTx/>
-              <a:buFont typeface="Arial" panose="020B0604020202020204" pitchFamily="34" charset="0"/>
-              <a:buChar char="•"/>
-              <a:tabLst/>
-              <a:defRPr/>
-            </a:pPr>
-            <a:r>
-              <a:rPr lang="en-US" baseline="0" dirty="0" err="1"/>
-              <a:t>En</a:t>
-            </a:r>
-            <a:r>
-              <a:rPr lang="en-US" baseline="0" dirty="0"/>
-              <a:t>-til-</a:t>
-            </a:r>
-            <a:r>
-              <a:rPr lang="en-US" baseline="0" dirty="0" err="1"/>
-              <a:t>en</a:t>
-            </a:r>
-            <a:r>
-              <a:rPr lang="en-US" baseline="0" dirty="0"/>
-              <a:t>-</a:t>
-            </a:r>
-            <a:r>
-              <a:rPr lang="en-US" baseline="0" dirty="0" err="1"/>
-              <a:t>relasjoner</a:t>
-            </a:r>
-            <a:endParaRPr lang="en-US" baseline="0" dirty="0"/>
-          </a:p>
-          <a:p>
-            <a:pPr marL="628650" lvl="1" indent="-171450">
-              <a:buFont typeface="Arial" panose="020B0604020202020204" pitchFamily="34" charset="0"/>
-              <a:buChar char="•"/>
-            </a:pPr>
-            <a:r>
-              <a:rPr lang="en-US" baseline="0" dirty="0" err="1"/>
-              <a:t>En</a:t>
-            </a:r>
-            <a:r>
-              <a:rPr lang="en-US" baseline="0" dirty="0"/>
-              <a:t>-til-mange-</a:t>
-            </a:r>
-            <a:r>
-              <a:rPr lang="en-US" baseline="0" dirty="0" err="1"/>
-              <a:t>relasjoner</a:t>
-            </a:r>
-            <a:endParaRPr lang="en-US" baseline="0" dirty="0"/>
-          </a:p>
-          <a:p>
-            <a:pPr marL="171450" indent="-171450">
-              <a:buFont typeface="Arial" panose="020B0604020202020204" pitchFamily="34" charset="0"/>
-              <a:buChar char="•"/>
-            </a:pPr>
-            <a:r>
-              <a:rPr lang="en-US" baseline="0" dirty="0"/>
-              <a:t>Ingen </a:t>
-            </a:r>
-            <a:r>
-              <a:rPr lang="en-US" baseline="0" dirty="0" err="1"/>
-              <a:t>forhåndsdefinering</a:t>
-            </a:r>
-            <a:r>
-              <a:rPr lang="en-US" baseline="0" dirty="0"/>
-              <a:t> </a:t>
-            </a:r>
-            <a:r>
-              <a:rPr lang="en-US" baseline="0" dirty="0" err="1"/>
-              <a:t>av</a:t>
-            </a:r>
-            <a:r>
-              <a:rPr lang="en-US" baseline="0" dirty="0"/>
-              <a:t> schema</a:t>
-            </a:r>
-          </a:p>
-          <a:p>
-            <a:pPr marL="628650" lvl="1" indent="-171450">
-              <a:buFont typeface="Arial" panose="020B0604020202020204" pitchFamily="34" charset="0"/>
-              <a:buChar char="•"/>
-            </a:pPr>
-            <a:r>
-              <a:rPr lang="en-US" baseline="0" dirty="0" err="1"/>
-              <a:t>Baseres</a:t>
-            </a:r>
-            <a:r>
-              <a:rPr lang="en-US" baseline="0" dirty="0"/>
-              <a:t> </a:t>
-            </a:r>
-            <a:r>
-              <a:rPr lang="en-US" baseline="0" dirty="0" err="1"/>
-              <a:t>på</a:t>
-            </a:r>
-            <a:r>
-              <a:rPr lang="en-US" baseline="0" dirty="0"/>
-              <a:t> </a:t>
-            </a:r>
-            <a:r>
-              <a:rPr lang="en-US" baseline="0" dirty="0" err="1"/>
-              <a:t>klassene</a:t>
-            </a:r>
-            <a:r>
-              <a:rPr lang="en-US" baseline="0" dirty="0"/>
-              <a:t> du </a:t>
-            </a:r>
-            <a:r>
-              <a:rPr lang="en-US" baseline="0" dirty="0" err="1"/>
-              <a:t>ønsker</a:t>
-            </a:r>
-            <a:r>
-              <a:rPr lang="en-US" baseline="0" dirty="0"/>
-              <a:t> å </a:t>
-            </a:r>
-            <a:r>
-              <a:rPr lang="en-US" baseline="0" dirty="0" err="1"/>
-              <a:t>lagre</a:t>
-            </a:r>
-            <a:endParaRPr lang="en-US" baseline="0" dirty="0"/>
-          </a:p>
-          <a:p>
-            <a:pPr marL="628650" lvl="1" indent="-171450">
-              <a:buFont typeface="Arial" panose="020B0604020202020204" pitchFamily="34" charset="0"/>
-              <a:buChar char="•"/>
-            </a:pPr>
-            <a:r>
-              <a:rPr lang="en-US" baseline="0" dirty="0" err="1"/>
-              <a:t>Henter</a:t>
-            </a:r>
-            <a:r>
-              <a:rPr lang="en-US" baseline="0" dirty="0"/>
-              <a:t> </a:t>
-            </a:r>
-            <a:r>
-              <a:rPr lang="en-US" baseline="0" dirty="0" err="1"/>
-              <a:t>indeksering</a:t>
-            </a:r>
-            <a:r>
-              <a:rPr lang="en-US" baseline="0" dirty="0"/>
-              <a:t>/</a:t>
-            </a:r>
-            <a:r>
-              <a:rPr lang="en-US" baseline="0" dirty="0" err="1"/>
-              <a:t>primærnøkkel</a:t>
-            </a:r>
-            <a:r>
-              <a:rPr lang="en-US" baseline="0" dirty="0"/>
-              <a:t> </a:t>
-            </a:r>
-            <a:r>
-              <a:rPr lang="en-US" baseline="0" dirty="0" err="1"/>
-              <a:t>fra</a:t>
-            </a:r>
-            <a:r>
-              <a:rPr lang="en-US" baseline="0" dirty="0"/>
-              <a:t> </a:t>
-            </a:r>
-            <a:r>
-              <a:rPr lang="en-US" baseline="0" dirty="0" err="1"/>
-              <a:t>klasse</a:t>
-            </a:r>
-            <a:endParaRPr lang="en-US" baseline="0" dirty="0"/>
-          </a:p>
-          <a:p>
-            <a:pPr marL="628650" lvl="1" indent="-171450">
-              <a:buFont typeface="Arial" panose="020B0604020202020204" pitchFamily="34" charset="0"/>
-              <a:buChar char="•"/>
-            </a:pPr>
-            <a:r>
-              <a:rPr lang="en-US" baseline="0" dirty="0" err="1"/>
-              <a:t>Kommer</a:t>
-            </a:r>
-            <a:r>
-              <a:rPr lang="en-US" baseline="0" dirty="0"/>
-              <a:t> </a:t>
-            </a:r>
-            <a:r>
-              <a:rPr lang="en-US" baseline="0" dirty="0" err="1"/>
-              <a:t>tilbake</a:t>
-            </a:r>
-            <a:r>
-              <a:rPr lang="en-US" baseline="0" dirty="0"/>
-              <a:t> til </a:t>
-            </a:r>
-            <a:r>
-              <a:rPr lang="en-US" baseline="0" dirty="0" err="1"/>
-              <a:t>dette</a:t>
-            </a:r>
-            <a:endParaRPr lang="en-US" baseline="0" dirty="0"/>
-          </a:p>
-          <a:p>
-            <a:pPr marL="171450" marR="0" lvl="0" indent="-171450" algn="l" defTabSz="914400" rtl="0" eaLnBrk="1" fontAlgn="auto" latinLnBrk="0" hangingPunct="1">
-              <a:lnSpc>
-                <a:spcPct val="100000"/>
-              </a:lnSpc>
-              <a:spcBef>
-                <a:spcPts val="0"/>
-              </a:spcBef>
-              <a:spcAft>
-                <a:spcPts val="0"/>
-              </a:spcAft>
-              <a:buClrTx/>
-              <a:buSzTx/>
-              <a:buFont typeface="Arial" panose="020B0604020202020204" pitchFamily="34" charset="0"/>
-              <a:buChar char="•"/>
-              <a:tabLst/>
-              <a:defRPr/>
-            </a:pPr>
-            <a:r>
-              <a:rPr lang="en-US" baseline="0" dirty="0" err="1"/>
-              <a:t>En</a:t>
-            </a:r>
-            <a:r>
-              <a:rPr lang="en-US" baseline="0" dirty="0"/>
-              <a:t> </a:t>
-            </a:r>
-            <a:r>
-              <a:rPr lang="en-US" baseline="0" dirty="0" err="1"/>
-              <a:t>kan</a:t>
-            </a:r>
-            <a:r>
-              <a:rPr lang="en-US" baseline="0" dirty="0"/>
-              <a:t> </a:t>
-            </a:r>
-            <a:r>
-              <a:rPr lang="en-US" baseline="0" dirty="0" err="1"/>
-              <a:t>kjøre</a:t>
-            </a:r>
-            <a:r>
-              <a:rPr lang="en-US" baseline="0" dirty="0"/>
-              <a:t> </a:t>
-            </a:r>
-            <a:r>
-              <a:rPr lang="en-US" baseline="0" dirty="0" err="1"/>
-              <a:t>spørringer</a:t>
-            </a:r>
-            <a:endParaRPr lang="en-US" baseline="0" dirty="0"/>
-          </a:p>
-          <a:p>
-            <a:pPr marL="628650" marR="0" lvl="1" indent="-171450" algn="l" defTabSz="914400" rtl="0" eaLnBrk="1" fontAlgn="auto" latinLnBrk="0" hangingPunct="1">
-              <a:lnSpc>
-                <a:spcPct val="100000"/>
-              </a:lnSpc>
-              <a:spcBef>
-                <a:spcPts val="0"/>
-              </a:spcBef>
-              <a:spcAft>
-                <a:spcPts val="0"/>
-              </a:spcAft>
-              <a:buClrTx/>
-              <a:buSzTx/>
-              <a:buFont typeface="Arial" panose="020B0604020202020204" pitchFamily="34" charset="0"/>
-              <a:buChar char="•"/>
-              <a:tabLst/>
-              <a:defRPr/>
-            </a:pPr>
-            <a:r>
-              <a:rPr lang="en-US" baseline="0" dirty="0"/>
-              <a:t>Realm </a:t>
-            </a:r>
-            <a:r>
-              <a:rPr lang="en-US" baseline="0" dirty="0" err="1"/>
-              <a:t>bruker</a:t>
-            </a:r>
-            <a:r>
-              <a:rPr lang="en-US" baseline="0" dirty="0"/>
-              <a:t> </a:t>
-            </a:r>
-            <a:r>
-              <a:rPr lang="en-US" baseline="0" dirty="0" err="1"/>
-              <a:t>hver</a:t>
-            </a:r>
-            <a:r>
-              <a:rPr lang="en-US" baseline="0" dirty="0"/>
-              <a:t> </a:t>
-            </a:r>
-            <a:r>
-              <a:rPr lang="en-US" baseline="0" dirty="0" err="1"/>
-              <a:t>plattforms</a:t>
-            </a:r>
-            <a:r>
-              <a:rPr lang="en-US" baseline="0" dirty="0"/>
-              <a:t> “</a:t>
-            </a:r>
-            <a:r>
-              <a:rPr lang="en-US" baseline="0" dirty="0" err="1"/>
-              <a:t>spørresyntaks</a:t>
-            </a:r>
-            <a:r>
-              <a:rPr lang="en-US" baseline="0" dirty="0"/>
-              <a:t>”</a:t>
-            </a:r>
           </a:p>
         </p:txBody>
       </p:sp>
@@ -3113,70 +1593,7 @@
               <a:buFont typeface="Arial" panose="020B0604020202020204" pitchFamily="34" charset="0"/>
               <a:buChar char="•"/>
             </a:pPr>
-            <a:r>
-              <a:rPr lang="nb-NO" baseline="0" noProof="0" dirty="0"/>
-              <a:t>Objekter er alltid oppdaterte</a:t>
-            </a:r>
-          </a:p>
-          <a:p>
-            <a:pPr marL="628650" lvl="1" indent="-171450">
-              <a:buFont typeface="Arial" panose="020B0604020202020204" pitchFamily="34" charset="0"/>
-              <a:buChar char="•"/>
-            </a:pPr>
-            <a:r>
-              <a:rPr lang="nb-NO" baseline="0" noProof="0" dirty="0"/>
-              <a:t>Vil alltid være identisk objekt I databasen</a:t>
-            </a:r>
-          </a:p>
-          <a:p>
-            <a:pPr marL="628650" lvl="1" indent="-171450">
-              <a:buFont typeface="Arial" panose="020B0604020202020204" pitchFamily="34" charset="0"/>
-              <a:buChar char="•"/>
-            </a:pPr>
-            <a:r>
-              <a:rPr lang="nb-NO" baseline="0" noProof="0" dirty="0"/>
-              <a:t>Varsling ved endring av egenskap</a:t>
-            </a:r>
-          </a:p>
-          <a:p>
-            <a:pPr marL="171450" indent="-171450">
-              <a:buFont typeface="Arial" panose="020B0604020202020204" pitchFamily="34" charset="0"/>
-              <a:buChar char="•"/>
-            </a:pPr>
-            <a:r>
-              <a:rPr lang="nb-NO" baseline="0" noProof="0" dirty="0"/>
-              <a:t>Spørringer er dynamiske</a:t>
-            </a:r>
-          </a:p>
-          <a:p>
-            <a:pPr marL="628650" lvl="1" indent="-171450">
-              <a:buFont typeface="Arial" panose="020B0604020202020204" pitchFamily="34" charset="0"/>
-              <a:buChar char="•"/>
-            </a:pPr>
-            <a:r>
-              <a:rPr lang="nb-NO" baseline="0" noProof="0" dirty="0"/>
-              <a:t>Ved endring eller innsetting av objekt oppdateres resultatet</a:t>
-            </a:r>
-          </a:p>
-          <a:p>
-            <a:pPr marL="628650" lvl="1" indent="-171450">
-              <a:buFont typeface="Arial" panose="020B0604020202020204" pitchFamily="34" charset="0"/>
-              <a:buChar char="•"/>
-            </a:pPr>
-            <a:r>
-              <a:rPr lang="nb-NO" baseline="0" noProof="0" dirty="0"/>
-              <a:t>Varsling ved endring</a:t>
-            </a:r>
-          </a:p>
-          <a:p>
-            <a:pPr marL="171450" indent="-171450">
-              <a:buFont typeface="Arial" panose="020B0604020202020204" pitchFamily="34" charset="0"/>
-              <a:buChar char="•"/>
-            </a:pPr>
-            <a:r>
-              <a:rPr lang="nb-NO" baseline="0" noProof="0" dirty="0"/>
-              <a:t>Integrerer med plattforms system for GUI-oppdateringer</a:t>
-            </a:r>
+            <a:endParaRPr lang="nb-NO" baseline="0" noProof="0" dirty="0"/>
           </a:p>
         </p:txBody>
       </p:sp>
@@ -3719,7 +2136,7 @@
             <a:fld id="{B61BEF0D-F0BB-DE4B-95CE-6DB70DBA9567}" type="datetimeFigureOut">
               <a:rPr lang="en-US" smtClean="0"/>
               <a:pPr/>
-              <a:t>3/2/2017</a:t>
+              <a:t>3/8/17</a:t>
             </a:fld>
             <a:endParaRPr lang="en-US" dirty="0"/>
           </a:p>
@@ -3778,13 +2195,13 @@
   <p:clrMapOvr>
     <a:masterClrMapping/>
   </p:clrMapOvr>
-  <mc:AlternateContent xmlns:mc="http://schemas.openxmlformats.org/markup-compatibility/2006">
-    <mc:Choice xmlns:p159="http://schemas.microsoft.com/office/powerpoint/2015/09/main" Requires="p159">
+  <mc:AlternateContent xmlns:mc="http://schemas.openxmlformats.org/markup-compatibility/2006" xmlns:p159="http://schemas.microsoft.com/office/powerpoint/2015/09/main">
+    <mc:Choice Requires="p159">
       <p:transition spd="slow">
         <p159:morph option="byObject"/>
       </p:transition>
     </mc:Choice>
-    <mc:Fallback>
+    <mc:Fallback xmlns="">
       <p:transition spd="slow">
         <p:fade/>
       </p:transition>
@@ -4029,7 +2446,7 @@
             <a:fld id="{B61BEF0D-F0BB-DE4B-95CE-6DB70DBA9567}" type="datetimeFigureOut">
               <a:rPr lang="en-US" smtClean="0"/>
               <a:pPr/>
-              <a:t>3/2/2017</a:t>
+              <a:t>3/8/17</a:t>
             </a:fld>
             <a:endParaRPr lang="en-US" dirty="0"/>
           </a:p>
@@ -4083,13 +2500,13 @@
   <p:clrMapOvr>
     <a:masterClrMapping/>
   </p:clrMapOvr>
-  <mc:AlternateContent xmlns:mc="http://schemas.openxmlformats.org/markup-compatibility/2006">
-    <mc:Choice xmlns:p159="http://schemas.microsoft.com/office/powerpoint/2015/09/main" Requires="p159">
+  <mc:AlternateContent xmlns:mc="http://schemas.openxmlformats.org/markup-compatibility/2006" xmlns:p159="http://schemas.microsoft.com/office/powerpoint/2015/09/main">
+    <mc:Choice Requires="p159">
       <p:transition spd="slow">
         <p159:morph option="byObject"/>
       </p:transition>
     </mc:Choice>
-    <mc:Fallback>
+    <mc:Fallback xmlns="">
       <p:transition spd="slow">
         <p:fade/>
       </p:transition>
@@ -4286,7 +2703,7 @@
             <a:fld id="{B61BEF0D-F0BB-DE4B-95CE-6DB70DBA9567}" type="datetimeFigureOut">
               <a:rPr lang="en-US" smtClean="0"/>
               <a:pPr/>
-              <a:t>3/2/2017</a:t>
+              <a:t>3/8/17</a:t>
             </a:fld>
             <a:endParaRPr lang="en-US" dirty="0"/>
           </a:p>
@@ -4340,13 +2757,13 @@
   <p:clrMapOvr>
     <a:masterClrMapping/>
   </p:clrMapOvr>
-  <mc:AlternateContent xmlns:mc="http://schemas.openxmlformats.org/markup-compatibility/2006">
-    <mc:Choice xmlns:p159="http://schemas.microsoft.com/office/powerpoint/2015/09/main" Requires="p159">
+  <mc:AlternateContent xmlns:mc="http://schemas.openxmlformats.org/markup-compatibility/2006" xmlns:p159="http://schemas.microsoft.com/office/powerpoint/2015/09/main">
+    <mc:Choice Requires="p159">
       <p:transition spd="slow">
         <p159:morph option="byObject"/>
       </p:transition>
     </mc:Choice>
-    <mc:Fallback>
+    <mc:Fallback xmlns="">
       <p:transition spd="slow">
         <p:fade/>
       </p:transition>
@@ -4835,7 +3252,7 @@
             <a:fld id="{B61BEF0D-F0BB-DE4B-95CE-6DB70DBA9567}" type="datetimeFigureOut">
               <a:rPr lang="en-US" smtClean="0"/>
               <a:pPr/>
-              <a:t>3/2/2017</a:t>
+              <a:t>3/8/17</a:t>
             </a:fld>
             <a:endParaRPr lang="en-US" dirty="0"/>
           </a:p>
@@ -4889,13 +3306,13 @@
   <p:clrMapOvr>
     <a:masterClrMapping/>
   </p:clrMapOvr>
-  <mc:AlternateContent xmlns:mc="http://schemas.openxmlformats.org/markup-compatibility/2006">
-    <mc:Choice xmlns:p159="http://schemas.microsoft.com/office/powerpoint/2015/09/main" Requires="p159">
+  <mc:AlternateContent xmlns:mc="http://schemas.openxmlformats.org/markup-compatibility/2006" xmlns:p159="http://schemas.microsoft.com/office/powerpoint/2015/09/main">
+    <mc:Choice Requires="p159">
       <p:transition spd="slow">
         <p159:morph option="byObject"/>
       </p:transition>
     </mc:Choice>
-    <mc:Fallback>
+    <mc:Fallback xmlns="">
       <p:transition spd="slow">
         <p:fade/>
       </p:transition>
@@ -5092,7 +3509,7 @@
             <a:fld id="{B61BEF0D-F0BB-DE4B-95CE-6DB70DBA9567}" type="datetimeFigureOut">
               <a:rPr lang="en-US" smtClean="0"/>
               <a:pPr/>
-              <a:t>3/2/2017</a:t>
+              <a:t>3/8/17</a:t>
             </a:fld>
             <a:endParaRPr lang="en-US" dirty="0"/>
           </a:p>
@@ -5146,13 +3563,13 @@
   <p:clrMapOvr>
     <a:masterClrMapping/>
   </p:clrMapOvr>
-  <mc:AlternateContent xmlns:mc="http://schemas.openxmlformats.org/markup-compatibility/2006">
-    <mc:Choice xmlns:p159="http://schemas.microsoft.com/office/powerpoint/2015/09/main" Requires="p159">
+  <mc:AlternateContent xmlns:mc="http://schemas.openxmlformats.org/markup-compatibility/2006" xmlns:p159="http://schemas.microsoft.com/office/powerpoint/2015/09/main">
+    <mc:Choice Requires="p159">
       <p:transition spd="slow">
         <p159:morph option="byObject"/>
       </p:transition>
     </mc:Choice>
-    <mc:Fallback>
+    <mc:Fallback xmlns="">
       <p:transition spd="slow">
         <p:fade/>
       </p:transition>
@@ -5633,7 +4050,7 @@
             <a:fld id="{B61BEF0D-F0BB-DE4B-95CE-6DB70DBA9567}" type="datetimeFigureOut">
               <a:rPr lang="en-US" smtClean="0"/>
               <a:pPr/>
-              <a:t>3/2/2017</a:t>
+              <a:t>3/8/17</a:t>
             </a:fld>
             <a:endParaRPr lang="en-US" dirty="0"/>
           </a:p>
@@ -5687,13 +4104,13 @@
   <p:clrMapOvr>
     <a:masterClrMapping/>
   </p:clrMapOvr>
-  <mc:AlternateContent xmlns:mc="http://schemas.openxmlformats.org/markup-compatibility/2006">
-    <mc:Choice xmlns:p159="http://schemas.microsoft.com/office/powerpoint/2015/09/main" Requires="p159">
+  <mc:AlternateContent xmlns:mc="http://schemas.openxmlformats.org/markup-compatibility/2006" xmlns:p159="http://schemas.microsoft.com/office/powerpoint/2015/09/main">
+    <mc:Choice Requires="p159">
       <p:transition spd="slow">
         <p159:morph option="byObject"/>
       </p:transition>
     </mc:Choice>
-    <mc:Fallback>
+    <mc:Fallback xmlns="">
       <p:transition spd="slow">
         <p:fade/>
       </p:transition>
@@ -5939,7 +4356,7 @@
             <a:fld id="{B61BEF0D-F0BB-DE4B-95CE-6DB70DBA9567}" type="datetimeFigureOut">
               <a:rPr lang="en-US" smtClean="0"/>
               <a:pPr/>
-              <a:t>3/2/2017</a:t>
+              <a:t>3/8/17</a:t>
             </a:fld>
             <a:endParaRPr lang="en-US" dirty="0"/>
           </a:p>
@@ -5993,13 +4410,13 @@
   <p:clrMapOvr>
     <a:masterClrMapping/>
   </p:clrMapOvr>
-  <mc:AlternateContent xmlns:mc="http://schemas.openxmlformats.org/markup-compatibility/2006">
-    <mc:Choice xmlns:p159="http://schemas.microsoft.com/office/powerpoint/2015/09/main" Requires="p159">
+  <mc:AlternateContent xmlns:mc="http://schemas.openxmlformats.org/markup-compatibility/2006" xmlns:p159="http://schemas.microsoft.com/office/powerpoint/2015/09/main">
+    <mc:Choice Requires="p159">
       <p:transition spd="slow">
         <p159:morph option="byObject"/>
       </p:transition>
     </mc:Choice>
-    <mc:Fallback>
+    <mc:Fallback xmlns="">
       <p:transition spd="slow">
         <p:fade/>
       </p:transition>
@@ -6122,7 +4539,7 @@
             <a:fld id="{B61BEF0D-F0BB-DE4B-95CE-6DB70DBA9567}" type="datetimeFigureOut">
               <a:rPr lang="en-US" smtClean="0"/>
               <a:pPr/>
-              <a:t>3/2/2017</a:t>
+              <a:t>3/8/17</a:t>
             </a:fld>
             <a:endParaRPr lang="en-US" dirty="0"/>
           </a:p>
@@ -6176,13 +4593,13 @@
   <p:clrMapOvr>
     <a:masterClrMapping/>
   </p:clrMapOvr>
-  <mc:AlternateContent xmlns:mc="http://schemas.openxmlformats.org/markup-compatibility/2006">
-    <mc:Choice xmlns:p159="http://schemas.microsoft.com/office/powerpoint/2015/09/main" Requires="p159">
+  <mc:AlternateContent xmlns:mc="http://schemas.openxmlformats.org/markup-compatibility/2006" xmlns:p159="http://schemas.microsoft.com/office/powerpoint/2015/09/main">
+    <mc:Choice Requires="p159">
       <p:transition spd="slow">
         <p159:morph option="byObject"/>
       </p:transition>
     </mc:Choice>
-    <mc:Fallback>
+    <mc:Fallback xmlns="">
       <p:transition spd="slow">
         <p:fade/>
       </p:transition>
@@ -6311,7 +4728,7 @@
             <a:fld id="{B61BEF0D-F0BB-DE4B-95CE-6DB70DBA9567}" type="datetimeFigureOut">
               <a:rPr lang="en-US" smtClean="0"/>
               <a:pPr/>
-              <a:t>3/2/2017</a:t>
+              <a:t>3/8/17</a:t>
             </a:fld>
             <a:endParaRPr lang="en-US" dirty="0"/>
           </a:p>
@@ -6365,13 +4782,13 @@
   <p:clrMapOvr>
     <a:masterClrMapping/>
   </p:clrMapOvr>
-  <mc:AlternateContent xmlns:mc="http://schemas.openxmlformats.org/markup-compatibility/2006">
-    <mc:Choice xmlns:p159="http://schemas.microsoft.com/office/powerpoint/2015/09/main" Requires="p159">
+  <mc:AlternateContent xmlns:mc="http://schemas.openxmlformats.org/markup-compatibility/2006" xmlns:p159="http://schemas.microsoft.com/office/powerpoint/2015/09/main">
+    <mc:Choice Requires="p159">
       <p:transition spd="slow">
         <p159:morph option="byObject"/>
       </p:transition>
     </mc:Choice>
-    <mc:Fallback>
+    <mc:Fallback xmlns="">
       <p:transition spd="slow">
         <p:fade/>
       </p:transition>
@@ -6477,7 +4894,7 @@
             <a:fld id="{B61BEF0D-F0BB-DE4B-95CE-6DB70DBA9567}" type="datetimeFigureOut">
               <a:rPr lang="en-US" smtClean="0"/>
               <a:pPr/>
-              <a:t>3/2/2017</a:t>
+              <a:t>3/8/17</a:t>
             </a:fld>
             <a:endParaRPr lang="en-US" dirty="0"/>
           </a:p>
@@ -6536,13 +4953,13 @@
   <p:clrMapOvr>
     <a:masterClrMapping/>
   </p:clrMapOvr>
-  <mc:AlternateContent xmlns:mc="http://schemas.openxmlformats.org/markup-compatibility/2006">
-    <mc:Choice xmlns:p159="http://schemas.microsoft.com/office/powerpoint/2015/09/main" Requires="p159">
+  <mc:AlternateContent xmlns:mc="http://schemas.openxmlformats.org/markup-compatibility/2006" xmlns:p159="http://schemas.microsoft.com/office/powerpoint/2015/09/main">
+    <mc:Choice Requires="p159">
       <p:transition spd="slow">
         <p159:morph option="byObject"/>
       </p:transition>
     </mc:Choice>
-    <mc:Fallback>
+    <mc:Fallback xmlns="">
       <p:transition spd="slow">
         <p:fade/>
       </p:transition>
@@ -6737,7 +5154,7 @@
             <a:fld id="{B61BEF0D-F0BB-DE4B-95CE-6DB70DBA9567}" type="datetimeFigureOut">
               <a:rPr lang="en-US" smtClean="0"/>
               <a:pPr/>
-              <a:t>3/2/2017</a:t>
+              <a:t>3/8/17</a:t>
             </a:fld>
             <a:endParaRPr lang="en-US" dirty="0"/>
           </a:p>
@@ -6791,13 +5208,13 @@
   <p:clrMapOvr>
     <a:masterClrMapping/>
   </p:clrMapOvr>
-  <mc:AlternateContent xmlns:mc="http://schemas.openxmlformats.org/markup-compatibility/2006">
-    <mc:Choice xmlns:p159="http://schemas.microsoft.com/office/powerpoint/2015/09/main" Requires="p159">
+  <mc:AlternateContent xmlns:mc="http://schemas.openxmlformats.org/markup-compatibility/2006" xmlns:p159="http://schemas.microsoft.com/office/powerpoint/2015/09/main">
+    <mc:Choice Requires="p159">
       <p:transition spd="slow">
         <p159:morph option="byObject"/>
       </p:transition>
     </mc:Choice>
-    <mc:Fallback>
+    <mc:Fallback xmlns="">
       <p:transition spd="slow">
         <p:fade/>
       </p:transition>
@@ -7020,7 +5437,7 @@
             <a:fld id="{B61BEF0D-F0BB-DE4B-95CE-6DB70DBA9567}" type="datetimeFigureOut">
               <a:rPr lang="en-US" smtClean="0"/>
               <a:pPr/>
-              <a:t>3/2/2017</a:t>
+              <a:t>3/8/17</a:t>
             </a:fld>
             <a:endParaRPr lang="en-US" dirty="0"/>
           </a:p>
@@ -7074,13 +5491,13 @@
   <p:clrMapOvr>
     <a:masterClrMapping/>
   </p:clrMapOvr>
-  <mc:AlternateContent xmlns:mc="http://schemas.openxmlformats.org/markup-compatibility/2006">
-    <mc:Choice xmlns:p159="http://schemas.microsoft.com/office/powerpoint/2015/09/main" Requires="p159">
+  <mc:AlternateContent xmlns:mc="http://schemas.openxmlformats.org/markup-compatibility/2006" xmlns:p159="http://schemas.microsoft.com/office/powerpoint/2015/09/main">
+    <mc:Choice Requires="p159">
       <p:transition spd="slow">
         <p159:morph option="byObject"/>
       </p:transition>
     </mc:Choice>
-    <mc:Fallback>
+    <mc:Fallback xmlns="">
       <p:transition spd="slow">
         <p:fade/>
       </p:transition>
@@ -7476,7 +5893,7 @@
             <a:fld id="{B61BEF0D-F0BB-DE4B-95CE-6DB70DBA9567}" type="datetimeFigureOut">
               <a:rPr lang="en-US" smtClean="0"/>
               <a:pPr/>
-              <a:t>3/2/2017</a:t>
+              <a:t>3/8/17</a:t>
             </a:fld>
             <a:endParaRPr lang="en-US" dirty="0"/>
           </a:p>
@@ -7530,13 +5947,13 @@
   <p:clrMapOvr>
     <a:masterClrMapping/>
   </p:clrMapOvr>
-  <mc:AlternateContent xmlns:mc="http://schemas.openxmlformats.org/markup-compatibility/2006">
-    <mc:Choice xmlns:p159="http://schemas.microsoft.com/office/powerpoint/2015/09/main" Requires="p159">
+  <mc:AlternateContent xmlns:mc="http://schemas.openxmlformats.org/markup-compatibility/2006" xmlns:p159="http://schemas.microsoft.com/office/powerpoint/2015/09/main">
+    <mc:Choice Requires="p159">
       <p:transition spd="slow">
         <p159:morph option="byObject"/>
       </p:transition>
     </mc:Choice>
-    <mc:Fallback>
+    <mc:Fallback xmlns="">
       <p:transition spd="slow">
         <p:fade/>
       </p:transition>
@@ -7608,7 +6025,7 @@
             <a:fld id="{B61BEF0D-F0BB-DE4B-95CE-6DB70DBA9567}" type="datetimeFigureOut">
               <a:rPr lang="en-US" smtClean="0"/>
               <a:pPr/>
-              <a:t>3/2/2017</a:t>
+              <a:t>3/8/17</a:t>
             </a:fld>
             <a:endParaRPr lang="en-US" dirty="0"/>
           </a:p>
@@ -7662,13 +6079,13 @@
   <p:clrMapOvr>
     <a:masterClrMapping/>
   </p:clrMapOvr>
-  <mc:AlternateContent xmlns:mc="http://schemas.openxmlformats.org/markup-compatibility/2006">
-    <mc:Choice xmlns:p159="http://schemas.microsoft.com/office/powerpoint/2015/09/main" Requires="p159">
+  <mc:AlternateContent xmlns:mc="http://schemas.openxmlformats.org/markup-compatibility/2006" xmlns:p159="http://schemas.microsoft.com/office/powerpoint/2015/09/main">
+    <mc:Choice Requires="p159">
       <p:transition spd="slow">
         <p159:morph option="byObject"/>
       </p:transition>
     </mc:Choice>
-    <mc:Fallback>
+    <mc:Fallback xmlns="">
       <p:transition spd="slow">
         <p:fade/>
       </p:transition>
@@ -7712,7 +6129,7 @@
             <a:fld id="{B61BEF0D-F0BB-DE4B-95CE-6DB70DBA9567}" type="datetimeFigureOut">
               <a:rPr lang="en-US" smtClean="0"/>
               <a:pPr/>
-              <a:t>3/2/2017</a:t>
+              <a:t>3/8/17</a:t>
             </a:fld>
             <a:endParaRPr lang="en-US" dirty="0"/>
           </a:p>
@@ -7766,13 +6183,13 @@
   <p:clrMapOvr>
     <a:masterClrMapping/>
   </p:clrMapOvr>
-  <mc:AlternateContent xmlns:mc="http://schemas.openxmlformats.org/markup-compatibility/2006">
-    <mc:Choice xmlns:p159="http://schemas.microsoft.com/office/powerpoint/2015/09/main" Requires="p159">
+  <mc:AlternateContent xmlns:mc="http://schemas.openxmlformats.org/markup-compatibility/2006" xmlns:p159="http://schemas.microsoft.com/office/powerpoint/2015/09/main">
+    <mc:Choice Requires="p159">
       <p:transition spd="slow">
         <p159:morph option="byObject"/>
       </p:transition>
     </mc:Choice>
-    <mc:Fallback>
+    <mc:Fallback xmlns="">
       <p:transition spd="slow">
         <p:fade/>
       </p:transition>
@@ -8009,7 +6426,7 @@
             <a:fld id="{B61BEF0D-F0BB-DE4B-95CE-6DB70DBA9567}" type="datetimeFigureOut">
               <a:rPr lang="en-US" smtClean="0"/>
               <a:pPr/>
-              <a:t>3/2/2017</a:t>
+              <a:t>3/8/17</a:t>
             </a:fld>
             <a:endParaRPr lang="en-US" dirty="0"/>
           </a:p>
@@ -8063,13 +6480,13 @@
   <p:clrMapOvr>
     <a:masterClrMapping/>
   </p:clrMapOvr>
-  <mc:AlternateContent xmlns:mc="http://schemas.openxmlformats.org/markup-compatibility/2006">
-    <mc:Choice xmlns:p159="http://schemas.microsoft.com/office/powerpoint/2015/09/main" Requires="p159">
+  <mc:AlternateContent xmlns:mc="http://schemas.openxmlformats.org/markup-compatibility/2006" xmlns:p159="http://schemas.microsoft.com/office/powerpoint/2015/09/main">
+    <mc:Choice Requires="p159">
       <p:transition spd="slow">
         <p159:morph option="byObject"/>
       </p:transition>
     </mc:Choice>
-    <mc:Fallback>
+    <mc:Fallback xmlns="">
       <p:transition spd="slow">
         <p:fade/>
       </p:transition>
@@ -8314,7 +6731,7 @@
             <a:fld id="{B61BEF0D-F0BB-DE4B-95CE-6DB70DBA9567}" type="datetimeFigureOut">
               <a:rPr lang="en-US" smtClean="0"/>
               <a:pPr/>
-              <a:t>3/2/2017</a:t>
+              <a:t>3/8/17</a:t>
             </a:fld>
             <a:endParaRPr lang="en-US" dirty="0"/>
           </a:p>
@@ -8368,13 +6785,13 @@
   <p:clrMapOvr>
     <a:masterClrMapping/>
   </p:clrMapOvr>
-  <mc:AlternateContent xmlns:mc="http://schemas.openxmlformats.org/markup-compatibility/2006">
-    <mc:Choice xmlns:p159="http://schemas.microsoft.com/office/powerpoint/2015/09/main" Requires="p159">
+  <mc:AlternateContent xmlns:mc="http://schemas.openxmlformats.org/markup-compatibility/2006" xmlns:p159="http://schemas.microsoft.com/office/powerpoint/2015/09/main">
+    <mc:Choice Requires="p159">
       <p:transition spd="slow">
         <p159:morph option="byObject"/>
       </p:transition>
     </mc:Choice>
-    <mc:Fallback>
+    <mc:Fallback xmlns="">
       <p:transition spd="slow">
         <p:fade/>
       </p:transition>
@@ -8852,7 +7269,7 @@
             <a:fld id="{B61BEF0D-F0BB-DE4B-95CE-6DB70DBA9567}" type="datetimeFigureOut">
               <a:rPr lang="en-US" smtClean="0"/>
               <a:pPr/>
-              <a:t>3/2/2017</a:t>
+              <a:t>3/8/17</a:t>
             </a:fld>
             <a:endParaRPr lang="en-US" dirty="0"/>
           </a:p>
@@ -8964,13 +7381,13 @@
     <p:sldLayoutId id="2147484489" r:id="rId16"/>
     <p:sldLayoutId id="2147484490" r:id="rId17"/>
   </p:sldLayoutIdLst>
-  <mc:AlternateContent xmlns:mc="http://schemas.openxmlformats.org/markup-compatibility/2006">
-    <mc:Choice xmlns:p159="http://schemas.microsoft.com/office/powerpoint/2015/09/main" Requires="p159">
+  <mc:AlternateContent xmlns:mc="http://schemas.openxmlformats.org/markup-compatibility/2006" xmlns:p159="http://schemas.microsoft.com/office/powerpoint/2015/09/main">
+    <mc:Choice Requires="p159">
       <p:transition spd="slow">
         <p159:morph option="byObject"/>
       </p:transition>
     </mc:Choice>
-    <mc:Fallback>
+    <mc:Fallback xmlns="">
       <p:transition spd="slow">
         <p:fade/>
       </p:transition>
@@ -9572,13 +7989,13 @@
   <p:clrMapOvr>
     <a:masterClrMapping/>
   </p:clrMapOvr>
-  <mc:AlternateContent xmlns:mc="http://schemas.openxmlformats.org/markup-compatibility/2006">
-    <mc:Choice xmlns:p159="http://schemas.microsoft.com/office/powerpoint/2015/09/main" Requires="p159">
+  <mc:AlternateContent xmlns:mc="http://schemas.openxmlformats.org/markup-compatibility/2006" xmlns:p159="http://schemas.microsoft.com/office/powerpoint/2015/09/main">
+    <mc:Choice Requires="p159">
       <p:transition spd="slow">
         <p159:morph option="byObject"/>
       </p:transition>
     </mc:Choice>
-    <mc:Fallback>
+    <mc:Fallback xmlns="">
       <p:transition spd="slow">
         <p:fade/>
       </p:transition>
@@ -9699,13 +8116,13 @@
   <p:clrMapOvr>
     <a:masterClrMapping/>
   </p:clrMapOvr>
-  <mc:AlternateContent xmlns:mc="http://schemas.openxmlformats.org/markup-compatibility/2006">
-    <mc:Choice xmlns:p159="http://schemas.microsoft.com/office/powerpoint/2015/09/main" Requires="p159">
+  <mc:AlternateContent xmlns:mc="http://schemas.openxmlformats.org/markup-compatibility/2006" xmlns:p159="http://schemas.microsoft.com/office/powerpoint/2015/09/main">
+    <mc:Choice Requires="p159">
       <p:transition spd="slow">
         <p159:morph option="byObject"/>
       </p:transition>
     </mc:Choice>
-    <mc:Fallback>
+    <mc:Fallback xmlns="">
       <p:transition spd="slow">
         <p:fade/>
       </p:transition>
@@ -9826,13 +8243,13 @@
   <p:clrMapOvr>
     <a:masterClrMapping/>
   </p:clrMapOvr>
-  <mc:AlternateContent xmlns:mc="http://schemas.openxmlformats.org/markup-compatibility/2006">
-    <mc:Choice xmlns:p159="http://schemas.microsoft.com/office/powerpoint/2015/09/main" Requires="p159">
+  <mc:AlternateContent xmlns:mc="http://schemas.openxmlformats.org/markup-compatibility/2006" xmlns:p159="http://schemas.microsoft.com/office/powerpoint/2015/09/main">
+    <mc:Choice Requires="p159">
       <p:transition spd="slow">
         <p159:morph option="byObject"/>
       </p:transition>
     </mc:Choice>
-    <mc:Fallback>
+    <mc:Fallback xmlns="">
       <p:transition spd="slow">
         <p:fade/>
       </p:transition>
@@ -9953,13 +8370,13 @@
   <p:clrMapOvr>
     <a:masterClrMapping/>
   </p:clrMapOvr>
-  <mc:AlternateContent xmlns:mc="http://schemas.openxmlformats.org/markup-compatibility/2006">
-    <mc:Choice xmlns:p159="http://schemas.microsoft.com/office/powerpoint/2015/09/main" Requires="p159">
+  <mc:AlternateContent xmlns:mc="http://schemas.openxmlformats.org/markup-compatibility/2006" xmlns:p159="http://schemas.microsoft.com/office/powerpoint/2015/09/main">
+    <mc:Choice Requires="p159">
       <p:transition spd="slow">
         <p159:morph option="byObject"/>
       </p:transition>
     </mc:Choice>
-    <mc:Fallback>
+    <mc:Fallback xmlns="">
       <p:transition spd="slow">
         <p:fade/>
       </p:transition>
@@ -10074,13 +8491,13 @@
   <p:clrMapOvr>
     <a:masterClrMapping/>
   </p:clrMapOvr>
-  <mc:AlternateContent xmlns:mc="http://schemas.openxmlformats.org/markup-compatibility/2006">
-    <mc:Choice xmlns:p159="http://schemas.microsoft.com/office/powerpoint/2015/09/main" Requires="p159">
+  <mc:AlternateContent xmlns:mc="http://schemas.openxmlformats.org/markup-compatibility/2006" xmlns:p159="http://schemas.microsoft.com/office/powerpoint/2015/09/main">
+    <mc:Choice Requires="p159">
       <p:transition spd="slow">
         <p159:morph option="byObject"/>
       </p:transition>
     </mc:Choice>
-    <mc:Fallback>
+    <mc:Fallback xmlns="">
       <p:transition spd="slow">
         <p:fade/>
       </p:transition>
@@ -10145,13 +8562,13 @@
   <p:clrMapOvr>
     <a:masterClrMapping/>
   </p:clrMapOvr>
-  <mc:AlternateContent xmlns:mc="http://schemas.openxmlformats.org/markup-compatibility/2006">
-    <mc:Choice xmlns:p159="http://schemas.microsoft.com/office/powerpoint/2015/09/main" Requires="p159">
+  <mc:AlternateContent xmlns:mc="http://schemas.openxmlformats.org/markup-compatibility/2006" xmlns:p159="http://schemas.microsoft.com/office/powerpoint/2015/09/main">
+    <mc:Choice Requires="p159">
       <p:transition spd="slow">
         <p159:morph option="byObject"/>
       </p:transition>
     </mc:Choice>
-    <mc:Fallback>
+    <mc:Fallback xmlns="">
       <p:transition spd="slow">
         <p:fade/>
       </p:transition>
@@ -11338,14 +9755,14 @@
                 <a:gridCol w="3829844">
                   <a:extLst>
                     <a:ext uri="{9D8B030D-6E8A-4147-A177-3AD203B41FA5}">
-                      <a16:colId xmlns:a16="http://schemas.microsoft.com/office/drawing/2014/main" val="20000"/>
+                      <a16:colId xmlns:a16="http://schemas.microsoft.com/office/drawing/2014/main" xmlns="" val="20000"/>
                     </a:ext>
                   </a:extLst>
                 </a:gridCol>
                 <a:gridCol w="3829844">
                   <a:extLst>
                     <a:ext uri="{9D8B030D-6E8A-4147-A177-3AD203B41FA5}">
-                      <a16:colId xmlns:a16="http://schemas.microsoft.com/office/drawing/2014/main" val="20001"/>
+                      <a16:colId xmlns:a16="http://schemas.microsoft.com/office/drawing/2014/main" xmlns="" val="20001"/>
                     </a:ext>
                   </a:extLst>
                 </a:gridCol>
@@ -11427,7 +9844,7 @@
                 </a:tc>
                 <a:extLst>
                   <a:ext uri="{0D108BD9-81ED-4DB2-BD59-A6C34878D82A}">
-                    <a16:rowId xmlns:a16="http://schemas.microsoft.com/office/drawing/2014/main" val="10000"/>
+                    <a16:rowId xmlns:a16="http://schemas.microsoft.com/office/drawing/2014/main" xmlns="" val="10000"/>
                   </a:ext>
                 </a:extLst>
               </a:tr>
@@ -11503,7 +9920,7 @@
                 </a:tc>
                 <a:extLst>
                   <a:ext uri="{0D108BD9-81ED-4DB2-BD59-A6C34878D82A}">
-                    <a16:rowId xmlns:a16="http://schemas.microsoft.com/office/drawing/2014/main" val="10001"/>
+                    <a16:rowId xmlns:a16="http://schemas.microsoft.com/office/drawing/2014/main" xmlns="" val="10001"/>
                   </a:ext>
                 </a:extLst>
               </a:tr>
@@ -11581,7 +9998,7 @@
                 </a:tc>
                 <a:extLst>
                   <a:ext uri="{0D108BD9-81ED-4DB2-BD59-A6C34878D82A}">
-                    <a16:rowId xmlns:a16="http://schemas.microsoft.com/office/drawing/2014/main" val="10002"/>
+                    <a16:rowId xmlns:a16="http://schemas.microsoft.com/office/drawing/2014/main" xmlns="" val="10002"/>
                   </a:ext>
                 </a:extLst>
               </a:tr>
@@ -11659,7 +10076,7 @@
                 </a:tc>
                 <a:extLst>
                   <a:ext uri="{0D108BD9-81ED-4DB2-BD59-A6C34878D82A}">
-                    <a16:rowId xmlns:a16="http://schemas.microsoft.com/office/drawing/2014/main" val="10003"/>
+                    <a16:rowId xmlns:a16="http://schemas.microsoft.com/office/drawing/2014/main" xmlns="" val="10003"/>
                   </a:ext>
                 </a:extLst>
               </a:tr>
@@ -11745,7 +10162,7 @@
                 </a:tc>
                 <a:extLst>
                   <a:ext uri="{0D108BD9-81ED-4DB2-BD59-A6C34878D82A}">
-                    <a16:rowId xmlns:a16="http://schemas.microsoft.com/office/drawing/2014/main" val="10004"/>
+                    <a16:rowId xmlns:a16="http://schemas.microsoft.com/office/drawing/2014/main" xmlns="" val="10004"/>
                   </a:ext>
                 </a:extLst>
               </a:tr>
@@ -11763,13 +10180,13 @@
   <p:clrMapOvr>
     <a:masterClrMapping/>
   </p:clrMapOvr>
-  <mc:AlternateContent xmlns:mc="http://schemas.openxmlformats.org/markup-compatibility/2006">
-    <mc:Choice xmlns:p159="http://schemas.microsoft.com/office/powerpoint/2015/09/main" Requires="p159">
+  <mc:AlternateContent xmlns:mc="http://schemas.openxmlformats.org/markup-compatibility/2006" xmlns:p159="http://schemas.microsoft.com/office/powerpoint/2015/09/main">
+    <mc:Choice Requires="p159">
       <p:transition spd="slow">
         <p159:morph option="byObject"/>
       </p:transition>
     </mc:Choice>
-    <mc:Fallback>
+    <mc:Fallback xmlns="">
       <p:transition spd="slow">
         <p:fade/>
       </p:transition>
@@ -11961,13 +10378,13 @@
   <p:clrMapOvr>
     <a:masterClrMapping/>
   </p:clrMapOvr>
-  <mc:AlternateContent xmlns:mc="http://schemas.openxmlformats.org/markup-compatibility/2006">
-    <mc:Choice xmlns:p159="http://schemas.microsoft.com/office/powerpoint/2015/09/main" Requires="p159">
+  <mc:AlternateContent xmlns:mc="http://schemas.openxmlformats.org/markup-compatibility/2006" xmlns:p159="http://schemas.microsoft.com/office/powerpoint/2015/09/main">
+    <mc:Choice Requires="p159">
       <p:transition spd="slow">
         <p159:morph option="byObject"/>
       </p:transition>
     </mc:Choice>
-    <mc:Fallback>
+    <mc:Fallback xmlns="">
       <p:transition spd="slow">
         <p:fade/>
       </p:transition>
@@ -12297,13 +10714,13 @@
   <p:clrMapOvr>
     <a:masterClrMapping/>
   </p:clrMapOvr>
-  <mc:AlternateContent xmlns:mc="http://schemas.openxmlformats.org/markup-compatibility/2006">
-    <mc:Choice xmlns:p159="http://schemas.microsoft.com/office/powerpoint/2015/09/main" Requires="p159">
+  <mc:AlternateContent xmlns:mc="http://schemas.openxmlformats.org/markup-compatibility/2006" xmlns:p159="http://schemas.microsoft.com/office/powerpoint/2015/09/main">
+    <mc:Choice Requires="p159">
       <p:transition spd="slow">
         <p159:morph option="byObject"/>
       </p:transition>
     </mc:Choice>
-    <mc:Fallback>
+    <mc:Fallback xmlns="">
       <p:transition spd="slow">
         <p:fade/>
       </p:transition>
@@ -12362,13 +10779,6 @@
               </a:rPr>
               <a:t>https://realm.io/about/</a:t>
             </a:r>
-            <a:endParaRPr lang="en-US" sz="1050" dirty="0">
-              <a:solidFill>
-                <a:schemeClr val="bg1">
-                  <a:lumMod val="95000"/>
-                </a:schemeClr>
-              </a:solidFill>
-            </a:endParaRPr>
           </a:p>
         </p:txBody>
       </p:sp>
@@ -12405,13 +10815,13 @@
   <p:clrMapOvr>
     <a:masterClrMapping/>
   </p:clrMapOvr>
-  <mc:AlternateContent xmlns:mc="http://schemas.openxmlformats.org/markup-compatibility/2006">
-    <mc:Choice xmlns:p159="http://schemas.microsoft.com/office/powerpoint/2015/09/main" Requires="p159">
+  <mc:AlternateContent xmlns:mc="http://schemas.openxmlformats.org/markup-compatibility/2006" xmlns:p159="http://schemas.microsoft.com/office/powerpoint/2015/09/main">
+    <mc:Choice Requires="p159">
       <p:transition spd="slow">
         <p159:morph option="byObject"/>
       </p:transition>
     </mc:Choice>
-    <mc:Fallback>
+    <mc:Fallback xmlns="">
       <p:transition spd="slow">
         <p:fade/>
       </p:transition>
@@ -12532,13 +10942,13 @@
   <p:clrMapOvr>
     <a:masterClrMapping/>
   </p:clrMapOvr>
-  <mc:AlternateContent xmlns:mc="http://schemas.openxmlformats.org/markup-compatibility/2006">
-    <mc:Choice xmlns:p159="http://schemas.microsoft.com/office/powerpoint/2015/09/main" Requires="p159">
+  <mc:AlternateContent xmlns:mc="http://schemas.openxmlformats.org/markup-compatibility/2006" xmlns:p159="http://schemas.microsoft.com/office/powerpoint/2015/09/main">
+    <mc:Choice Requires="p159">
       <p:transition spd="slow">
         <p159:morph option="byObject"/>
       </p:transition>
     </mc:Choice>
-    <mc:Fallback>
+    <mc:Fallback xmlns="">
       <p:transition spd="slow">
         <p:fade/>
       </p:transition>
@@ -12784,13 +11194,13 @@
   <p:clrMapOvr>
     <a:masterClrMapping/>
   </p:clrMapOvr>
-  <mc:AlternateContent xmlns:mc="http://schemas.openxmlformats.org/markup-compatibility/2006">
-    <mc:Choice xmlns:p159="http://schemas.microsoft.com/office/powerpoint/2015/09/main" Requires="p159">
+  <mc:AlternateContent xmlns:mc="http://schemas.openxmlformats.org/markup-compatibility/2006" xmlns:p159="http://schemas.microsoft.com/office/powerpoint/2015/09/main">
+    <mc:Choice Requires="p159">
       <p:transition spd="slow">
         <p159:morph option="byObject"/>
       </p:transition>
     </mc:Choice>
-    <mc:Fallback>
+    <mc:Fallback xmlns="">
       <p:transition spd="slow">
         <p:fade/>
       </p:transition>
@@ -12880,10 +11290,10 @@
         </p:nvGrpSpPr>
         <p:grpSpPr>
           <a:xfrm>
-            <a:off x="3164682" y="1398856"/>
-            <a:ext cx="5862636" cy="4060288"/>
+            <a:off x="3356049" y="1398856"/>
+            <a:ext cx="5479902" cy="4060288"/>
             <a:chOff x="4462206" y="1733550"/>
-            <a:chExt cx="5862636" cy="4060288"/>
+            <a:chExt cx="5479902" cy="4060288"/>
           </a:xfrm>
         </p:grpSpPr>
         <p:sp>
@@ -12895,7 +11305,7 @@
           <p:spPr>
             <a:xfrm>
               <a:off x="7375380" y="3500765"/>
-              <a:ext cx="2949462" cy="523220"/>
+              <a:ext cx="2566728" cy="523220"/>
             </a:xfrm>
             <a:prstGeom prst="rect">
               <a:avLst/>
@@ -12909,8 +11319,8 @@
             <a:lstStyle/>
             <a:p>
               <a:r>
-                <a:rPr lang="en-US" sz="2800" dirty="0" err="1"/>
-                <a:t>Relasjonsdatabase</a:t>
+                <a:rPr lang="en-US" sz="2800" smtClean="0"/>
+                <a:t>Objektdatabase</a:t>
               </a:r>
               <a:endParaRPr lang="en-US" sz="2800" dirty="0"/>
             </a:p>
@@ -12951,13 +11361,13 @@
   <p:clrMapOvr>
     <a:masterClrMapping/>
   </p:clrMapOvr>
-  <mc:AlternateContent xmlns:mc="http://schemas.openxmlformats.org/markup-compatibility/2006">
-    <mc:Choice xmlns:p159="http://schemas.microsoft.com/office/powerpoint/2015/09/main" Requires="p159">
+  <mc:AlternateContent xmlns:mc="http://schemas.openxmlformats.org/markup-compatibility/2006" xmlns:p159="http://schemas.microsoft.com/office/powerpoint/2015/09/main">
+    <mc:Choice Requires="p159">
       <p:transition spd="slow">
         <p159:morph option="byObject"/>
       </p:transition>
     </mc:Choice>
-    <mc:Fallback>
+    <mc:Fallback xmlns="">
       <p:transition spd="slow">
         <p:fade/>
       </p:transition>
@@ -13039,13 +11449,6 @@
               </a:rPr>
               <a:t>https://thenounproject.com/term/lightning/547981/</a:t>
             </a:r>
-            <a:endParaRPr lang="en-US" sz="1050" dirty="0">
-              <a:solidFill>
-                <a:schemeClr val="bg1">
-                  <a:lumMod val="95000"/>
-                </a:schemeClr>
-              </a:solidFill>
-            </a:endParaRPr>
           </a:p>
         </p:txBody>
       </p:sp>
@@ -13203,13 +11606,13 @@
   <p:clrMapOvr>
     <a:masterClrMapping/>
   </p:clrMapOvr>
-  <mc:AlternateContent xmlns:mc="http://schemas.openxmlformats.org/markup-compatibility/2006">
-    <mc:Choice xmlns:p159="http://schemas.microsoft.com/office/powerpoint/2015/09/main" Requires="p159">
+  <mc:AlternateContent xmlns:mc="http://schemas.openxmlformats.org/markup-compatibility/2006" xmlns:p159="http://schemas.microsoft.com/office/powerpoint/2015/09/main">
+    <mc:Choice Requires="p159">
       <p:transition spd="slow">
         <p159:morph option="byObject"/>
       </p:transition>
     </mc:Choice>
-    <mc:Fallback>
+    <mc:Fallback xmlns="">
       <p:transition spd="slow">
         <p:fade/>
       </p:transition>

</xml_diff>